<commit_message>
correction to the presentation
</commit_message>
<xml_diff>
--- a/Documentation/Presentation.pptx
+++ b/Documentation/Presentation.pptx
@@ -196,7 +196,7 @@
           <a:noFill/>
           <a:extLst>
             <a:ext uri="{909E8E84-426E-40dd-AFC4-6F175D3DCCD1}">
-              <a14:hiddenFill xmlns:a14="http://schemas.microsoft.com/office/drawing/2010/main" xmlns="">
+              <a14:hiddenFill xmlns="" xmlns:a14="http://schemas.microsoft.com/office/drawing/2010/main">
                 <a:solidFill>
                   <a:srgbClr val="FFFFFF"/>
                 </a:solidFill>
@@ -256,7 +256,7 @@
             </a:ln>
             <a:extLst>
               <a:ext uri="{91240B29-F687-4f45-9708-019B960494DF}">
-                <a14:hiddenLine xmlns:a14="http://schemas.microsoft.com/office/drawing/2010/main" xmlns="" w="9525">
+                <a14:hiddenLine xmlns="" xmlns:a14="http://schemas.microsoft.com/office/drawing/2010/main" w="9525">
                   <a:solidFill>
                     <a:srgbClr val="000000"/>
                   </a:solidFill>
@@ -346,7 +346,7 @@
             </a:ln>
             <a:extLst>
               <a:ext uri="{91240B29-F687-4f45-9708-019B960494DF}">
-                <a14:hiddenLine xmlns:a14="http://schemas.microsoft.com/office/drawing/2010/main" xmlns="" w="9525">
+                <a14:hiddenLine xmlns="" xmlns:a14="http://schemas.microsoft.com/office/drawing/2010/main" w="9525">
                   <a:solidFill>
                     <a:srgbClr val="000000"/>
                   </a:solidFill>
@@ -436,7 +436,7 @@
             </a:ln>
             <a:extLst>
               <a:ext uri="{91240B29-F687-4f45-9708-019B960494DF}">
-                <a14:hiddenLine xmlns:a14="http://schemas.microsoft.com/office/drawing/2010/main" xmlns="" w="9525">
+                <a14:hiddenLine xmlns="" xmlns:a14="http://schemas.microsoft.com/office/drawing/2010/main" w="9525">
                   <a:solidFill>
                     <a:srgbClr val="000000"/>
                   </a:solidFill>
@@ -470,7 +470,7 @@
             </a:ln>
             <a:extLst>
               <a:ext uri="{91240B29-F687-4f45-9708-019B960494DF}">
-                <a14:hiddenLine xmlns:a14="http://schemas.microsoft.com/office/drawing/2010/main" xmlns="" w="9525">
+                <a14:hiddenLine xmlns="" xmlns:a14="http://schemas.microsoft.com/office/drawing/2010/main" w="9525">
                   <a:solidFill>
                     <a:srgbClr val="000000"/>
                   </a:solidFill>
@@ -560,7 +560,7 @@
             </a:ln>
             <a:extLst>
               <a:ext uri="{91240B29-F687-4f45-9708-019B960494DF}">
-                <a14:hiddenLine xmlns:a14="http://schemas.microsoft.com/office/drawing/2010/main" xmlns="" w="9525">
+                <a14:hiddenLine xmlns="" xmlns:a14="http://schemas.microsoft.com/office/drawing/2010/main" w="9525">
                   <a:solidFill>
                     <a:srgbClr val="000000"/>
                   </a:solidFill>
@@ -622,7 +622,7 @@
             </a:ln>
             <a:extLst>
               <a:ext uri="{91240B29-F687-4f45-9708-019B960494DF}">
-                <a14:hiddenLine xmlns:a14="http://schemas.microsoft.com/office/drawing/2010/main" xmlns="" w="9525">
+                <a14:hiddenLine xmlns="" xmlns:a14="http://schemas.microsoft.com/office/drawing/2010/main" w="9525">
                   <a:solidFill>
                     <a:srgbClr val="000000"/>
                   </a:solidFill>
@@ -684,7 +684,7 @@
             </a:ln>
             <a:extLst>
               <a:ext uri="{91240B29-F687-4f45-9708-019B960494DF}">
-                <a14:hiddenLine xmlns:a14="http://schemas.microsoft.com/office/drawing/2010/main" xmlns="" w="9525">
+                <a14:hiddenLine xmlns="" xmlns:a14="http://schemas.microsoft.com/office/drawing/2010/main" w="9525">
                   <a:solidFill>
                     <a:srgbClr val="000000"/>
                   </a:solidFill>
@@ -774,7 +774,7 @@
             </a:ln>
             <a:extLst>
               <a:ext uri="{91240B29-F687-4f45-9708-019B960494DF}">
-                <a14:hiddenLine xmlns:a14="http://schemas.microsoft.com/office/drawing/2010/main" xmlns="" w="9525">
+                <a14:hiddenLine xmlns="" xmlns:a14="http://schemas.microsoft.com/office/drawing/2010/main" w="9525">
                   <a:solidFill>
                     <a:srgbClr val="000000"/>
                   </a:solidFill>
@@ -836,7 +836,7 @@
             </a:ln>
             <a:extLst>
               <a:ext uri="{91240B29-F687-4f45-9708-019B960494DF}">
-                <a14:hiddenLine xmlns:a14="http://schemas.microsoft.com/office/drawing/2010/main" xmlns="" w="9525">
+                <a14:hiddenLine xmlns="" xmlns:a14="http://schemas.microsoft.com/office/drawing/2010/main" w="9525">
                   <a:solidFill>
                     <a:srgbClr val="000000"/>
                   </a:solidFill>
@@ -898,7 +898,7 @@
             </a:ln>
             <a:extLst>
               <a:ext uri="{91240B29-F687-4f45-9708-019B960494DF}">
-                <a14:hiddenLine xmlns:a14="http://schemas.microsoft.com/office/drawing/2010/main" xmlns="" w="9525">
+                <a14:hiddenLine xmlns="" xmlns:a14="http://schemas.microsoft.com/office/drawing/2010/main" w="9525">
                   <a:solidFill>
                     <a:srgbClr val="000000"/>
                   </a:solidFill>
@@ -988,7 +988,7 @@
             </a:ln>
             <a:extLst>
               <a:ext uri="{91240B29-F687-4f45-9708-019B960494DF}">
-                <a14:hiddenLine xmlns:a14="http://schemas.microsoft.com/office/drawing/2010/main" xmlns="" w="9525">
+                <a14:hiddenLine xmlns="" xmlns:a14="http://schemas.microsoft.com/office/drawing/2010/main" w="9525">
                   <a:solidFill>
                     <a:srgbClr val="000000"/>
                   </a:solidFill>
@@ -1078,7 +1078,7 @@
             </a:ln>
             <a:extLst>
               <a:ext uri="{91240B29-F687-4f45-9708-019B960494DF}">
-                <a14:hiddenLine xmlns:a14="http://schemas.microsoft.com/office/drawing/2010/main" xmlns="" w="9525">
+                <a14:hiddenLine xmlns="" xmlns:a14="http://schemas.microsoft.com/office/drawing/2010/main" w="9525">
                   <a:solidFill>
                     <a:srgbClr val="000000"/>
                   </a:solidFill>
@@ -1140,7 +1140,7 @@
             </a:ln>
             <a:extLst>
               <a:ext uri="{91240B29-F687-4f45-9708-019B960494DF}">
-                <a14:hiddenLine xmlns:a14="http://schemas.microsoft.com/office/drawing/2010/main" xmlns="" w="9525">
+                <a14:hiddenLine xmlns="" xmlns:a14="http://schemas.microsoft.com/office/drawing/2010/main" w="9525">
                   <a:solidFill>
                     <a:srgbClr val="000000"/>
                   </a:solidFill>
@@ -1250,7 +1250,7 @@
             </a:ln>
             <a:extLst>
               <a:ext uri="{91240B29-F687-4f45-9708-019B960494DF}">
-                <a14:hiddenLine xmlns:a14="http://schemas.microsoft.com/office/drawing/2010/main" xmlns="" w="9525">
+                <a14:hiddenLine xmlns="" xmlns:a14="http://schemas.microsoft.com/office/drawing/2010/main" w="9525">
                   <a:solidFill>
                     <a:srgbClr val="000000"/>
                   </a:solidFill>
@@ -1312,7 +1312,7 @@
             </a:ln>
             <a:extLst>
               <a:ext uri="{91240B29-F687-4f45-9708-019B960494DF}">
-                <a14:hiddenLine xmlns:a14="http://schemas.microsoft.com/office/drawing/2010/main" xmlns="" w="9525">
+                <a14:hiddenLine xmlns="" xmlns:a14="http://schemas.microsoft.com/office/drawing/2010/main" w="9525">
                   <a:solidFill>
                     <a:srgbClr val="000000"/>
                   </a:solidFill>
@@ -1402,7 +1402,7 @@
             </a:ln>
             <a:extLst>
               <a:ext uri="{91240B29-F687-4f45-9708-019B960494DF}">
-                <a14:hiddenLine xmlns:a14="http://schemas.microsoft.com/office/drawing/2010/main" xmlns="" w="9525">
+                <a14:hiddenLine xmlns="" xmlns:a14="http://schemas.microsoft.com/office/drawing/2010/main" w="9525">
                   <a:solidFill>
                     <a:srgbClr val="000000"/>
                   </a:solidFill>
@@ -1492,7 +1492,7 @@
             </a:ln>
             <a:extLst>
               <a:ext uri="{91240B29-F687-4f45-9708-019B960494DF}">
-                <a14:hiddenLine xmlns:a14="http://schemas.microsoft.com/office/drawing/2010/main" xmlns="" w="9525">
+                <a14:hiddenLine xmlns="" xmlns:a14="http://schemas.microsoft.com/office/drawing/2010/main" w="9525">
                   <a:solidFill>
                     <a:srgbClr val="000000"/>
                   </a:solidFill>
@@ -1554,7 +1554,7 @@
             </a:ln>
             <a:extLst>
               <a:ext uri="{91240B29-F687-4f45-9708-019B960494DF}">
-                <a14:hiddenLine xmlns:a14="http://schemas.microsoft.com/office/drawing/2010/main" xmlns="" w="9525">
+                <a14:hiddenLine xmlns="" xmlns:a14="http://schemas.microsoft.com/office/drawing/2010/main" w="9525">
                   <a:solidFill>
                     <a:srgbClr val="000000"/>
                   </a:solidFill>
@@ -1644,7 +1644,7 @@
             </a:ln>
             <a:extLst>
               <a:ext uri="{91240B29-F687-4f45-9708-019B960494DF}">
-                <a14:hiddenLine xmlns:a14="http://schemas.microsoft.com/office/drawing/2010/main" xmlns="" w="9525">
+                <a14:hiddenLine xmlns="" xmlns:a14="http://schemas.microsoft.com/office/drawing/2010/main" w="9525">
                   <a:solidFill>
                     <a:srgbClr val="000000"/>
                   </a:solidFill>
@@ -1734,7 +1734,7 @@
             </a:ln>
             <a:extLst>
               <a:ext uri="{91240B29-F687-4f45-9708-019B960494DF}">
-                <a14:hiddenLine xmlns:a14="http://schemas.microsoft.com/office/drawing/2010/main" xmlns="" w="9525">
+                <a14:hiddenLine xmlns="" xmlns:a14="http://schemas.microsoft.com/office/drawing/2010/main" w="9525">
                   <a:solidFill>
                     <a:srgbClr val="000000"/>
                   </a:solidFill>
@@ -1790,7 +1790,7 @@
             </a:ln>
             <a:extLst>
               <a:ext uri="{91240B29-F687-4f45-9708-019B960494DF}">
-                <a14:hiddenLine xmlns:a14="http://schemas.microsoft.com/office/drawing/2010/main" xmlns="" w="9525">
+                <a14:hiddenLine xmlns="" xmlns:a14="http://schemas.microsoft.com/office/drawing/2010/main" w="9525">
                   <a:solidFill>
                     <a:srgbClr val="000000"/>
                   </a:solidFill>
@@ -1880,7 +1880,7 @@
             </a:ln>
             <a:extLst>
               <a:ext uri="{91240B29-F687-4f45-9708-019B960494DF}">
-                <a14:hiddenLine xmlns:a14="http://schemas.microsoft.com/office/drawing/2010/main" xmlns="" w="9525">
+                <a14:hiddenLine xmlns="" xmlns:a14="http://schemas.microsoft.com/office/drawing/2010/main" w="9525">
                   <a:solidFill>
                     <a:srgbClr val="000000"/>
                   </a:solidFill>
@@ -1936,7 +1936,7 @@
             </a:ln>
             <a:extLst>
               <a:ext uri="{91240B29-F687-4f45-9708-019B960494DF}">
-                <a14:hiddenLine xmlns:a14="http://schemas.microsoft.com/office/drawing/2010/main" xmlns="" w="9525">
+                <a14:hiddenLine xmlns="" xmlns:a14="http://schemas.microsoft.com/office/drawing/2010/main" w="9525">
                   <a:solidFill>
                     <a:srgbClr val="000000"/>
                   </a:solidFill>
@@ -2026,7 +2026,7 @@
             </a:ln>
             <a:extLst>
               <a:ext uri="{91240B29-F687-4f45-9708-019B960494DF}">
-                <a14:hiddenLine xmlns:a14="http://schemas.microsoft.com/office/drawing/2010/main" xmlns="" w="9525">
+                <a14:hiddenLine xmlns="" xmlns:a14="http://schemas.microsoft.com/office/drawing/2010/main" w="9525">
                   <a:solidFill>
                     <a:srgbClr val="000000"/>
                   </a:solidFill>
@@ -2094,7 +2094,7 @@
             </a:ln>
             <a:extLst>
               <a:ext uri="{91240B29-F687-4f45-9708-019B960494DF}">
-                <a14:hiddenLine xmlns:a14="http://schemas.microsoft.com/office/drawing/2010/main" xmlns="" w="9525">
+                <a14:hiddenLine xmlns="" xmlns:a14="http://schemas.microsoft.com/office/drawing/2010/main" w="9525">
                   <a:solidFill>
                     <a:srgbClr val="000000"/>
                   </a:solidFill>
@@ -2184,7 +2184,7 @@
             </a:ln>
             <a:extLst>
               <a:ext uri="{91240B29-F687-4f45-9708-019B960494DF}">
-                <a14:hiddenLine xmlns:a14="http://schemas.microsoft.com/office/drawing/2010/main" xmlns="" w="9525">
+                <a14:hiddenLine xmlns="" xmlns:a14="http://schemas.microsoft.com/office/drawing/2010/main" w="9525">
                   <a:solidFill>
                     <a:srgbClr val="000000"/>
                   </a:solidFill>
@@ -2252,7 +2252,7 @@
             </a:ln>
             <a:extLst>
               <a:ext uri="{91240B29-F687-4f45-9708-019B960494DF}">
-                <a14:hiddenLine xmlns:a14="http://schemas.microsoft.com/office/drawing/2010/main" xmlns="" w="9525">
+                <a14:hiddenLine xmlns="" xmlns:a14="http://schemas.microsoft.com/office/drawing/2010/main" w="9525">
                   <a:solidFill>
                     <a:srgbClr val="000000"/>
                   </a:solidFill>
@@ -2342,7 +2342,7 @@
             </a:ln>
             <a:extLst>
               <a:ext uri="{91240B29-F687-4f45-9708-019B960494DF}">
-                <a14:hiddenLine xmlns:a14="http://schemas.microsoft.com/office/drawing/2010/main" xmlns="" w="9525">
+                <a14:hiddenLine xmlns="" xmlns:a14="http://schemas.microsoft.com/office/drawing/2010/main" w="9525">
                   <a:solidFill>
                     <a:srgbClr val="000000"/>
                   </a:solidFill>
@@ -2376,7 +2376,7 @@
             </a:ln>
             <a:extLst>
               <a:ext uri="{91240B29-F687-4f45-9708-019B960494DF}">
-                <a14:hiddenLine xmlns:a14="http://schemas.microsoft.com/office/drawing/2010/main" xmlns="" w="9525">
+                <a14:hiddenLine xmlns="" xmlns:a14="http://schemas.microsoft.com/office/drawing/2010/main" w="9525">
                   <a:solidFill>
                     <a:srgbClr val="000000"/>
                   </a:solidFill>
@@ -2466,7 +2466,7 @@
             </a:ln>
             <a:extLst>
               <a:ext uri="{91240B29-F687-4f45-9708-019B960494DF}">
-                <a14:hiddenLine xmlns:a14="http://schemas.microsoft.com/office/drawing/2010/main" xmlns="" w="9525">
+                <a14:hiddenLine xmlns="" xmlns:a14="http://schemas.microsoft.com/office/drawing/2010/main" w="9525">
                   <a:solidFill>
                     <a:srgbClr val="000000"/>
                   </a:solidFill>
@@ -2528,7 +2528,7 @@
             </a:ln>
             <a:extLst>
               <a:ext uri="{91240B29-F687-4f45-9708-019B960494DF}">
-                <a14:hiddenLine xmlns:a14="http://schemas.microsoft.com/office/drawing/2010/main" xmlns="" w="9525">
+                <a14:hiddenLine xmlns="" xmlns:a14="http://schemas.microsoft.com/office/drawing/2010/main" w="9525">
                   <a:solidFill>
                     <a:srgbClr val="000000"/>
                   </a:solidFill>
@@ -2590,7 +2590,7 @@
             </a:ln>
             <a:extLst>
               <a:ext uri="{91240B29-F687-4f45-9708-019B960494DF}">
-                <a14:hiddenLine xmlns:a14="http://schemas.microsoft.com/office/drawing/2010/main" xmlns="" w="9525">
+                <a14:hiddenLine xmlns="" xmlns:a14="http://schemas.microsoft.com/office/drawing/2010/main" w="9525">
                   <a:solidFill>
                     <a:srgbClr val="000000"/>
                   </a:solidFill>
@@ -2680,7 +2680,7 @@
             </a:ln>
             <a:extLst>
               <a:ext uri="{91240B29-F687-4f45-9708-019B960494DF}">
-                <a14:hiddenLine xmlns:a14="http://schemas.microsoft.com/office/drawing/2010/main" xmlns="" w="9525">
+                <a14:hiddenLine xmlns="" xmlns:a14="http://schemas.microsoft.com/office/drawing/2010/main" w="9525">
                   <a:solidFill>
                     <a:srgbClr val="000000"/>
                   </a:solidFill>
@@ -2748,7 +2748,7 @@
             </a:ln>
             <a:extLst>
               <a:ext uri="{91240B29-F687-4f45-9708-019B960494DF}">
-                <a14:hiddenLine xmlns:a14="http://schemas.microsoft.com/office/drawing/2010/main" xmlns="" w="9525">
+                <a14:hiddenLine xmlns="" xmlns:a14="http://schemas.microsoft.com/office/drawing/2010/main" w="9525">
                   <a:solidFill>
                     <a:srgbClr val="000000"/>
                   </a:solidFill>
@@ -2810,7 +2810,7 @@
             </a:ln>
             <a:extLst>
               <a:ext uri="{91240B29-F687-4f45-9708-019B960494DF}">
-                <a14:hiddenLine xmlns:a14="http://schemas.microsoft.com/office/drawing/2010/main" xmlns="" w="9525">
+                <a14:hiddenLine xmlns="" xmlns:a14="http://schemas.microsoft.com/office/drawing/2010/main" w="9525">
                   <a:solidFill>
                     <a:srgbClr val="000000"/>
                   </a:solidFill>
@@ -2900,7 +2900,7 @@
             </a:ln>
             <a:extLst>
               <a:ext uri="{91240B29-F687-4f45-9708-019B960494DF}">
-                <a14:hiddenLine xmlns:a14="http://schemas.microsoft.com/office/drawing/2010/main" xmlns="" w="9525">
+                <a14:hiddenLine xmlns="" xmlns:a14="http://schemas.microsoft.com/office/drawing/2010/main" w="9525">
                   <a:solidFill>
                     <a:srgbClr val="000000"/>
                   </a:solidFill>
@@ -2962,7 +2962,7 @@
             </a:ln>
             <a:extLst>
               <a:ext uri="{91240B29-F687-4f45-9708-019B960494DF}">
-                <a14:hiddenLine xmlns:a14="http://schemas.microsoft.com/office/drawing/2010/main" xmlns="" w="9525">
+                <a14:hiddenLine xmlns="" xmlns:a14="http://schemas.microsoft.com/office/drawing/2010/main" w="9525">
                   <a:solidFill>
                     <a:srgbClr val="000000"/>
                   </a:solidFill>
@@ -3052,7 +3052,7 @@
             </a:ln>
             <a:extLst>
               <a:ext uri="{91240B29-F687-4f45-9708-019B960494DF}">
-                <a14:hiddenLine xmlns:a14="http://schemas.microsoft.com/office/drawing/2010/main" xmlns="" w="9525">
+                <a14:hiddenLine xmlns="" xmlns:a14="http://schemas.microsoft.com/office/drawing/2010/main" w="9525">
                   <a:solidFill>
                     <a:srgbClr val="000000"/>
                   </a:solidFill>
@@ -3114,7 +3114,7 @@
             </a:ln>
             <a:extLst>
               <a:ext uri="{91240B29-F687-4f45-9708-019B960494DF}">
-                <a14:hiddenLine xmlns:a14="http://schemas.microsoft.com/office/drawing/2010/main" xmlns="" w="9525">
+                <a14:hiddenLine xmlns="" xmlns:a14="http://schemas.microsoft.com/office/drawing/2010/main" w="9525">
                   <a:solidFill>
                     <a:srgbClr val="000000"/>
                   </a:solidFill>
@@ -3204,7 +3204,7 @@
             </a:ln>
             <a:extLst>
               <a:ext uri="{91240B29-F687-4f45-9708-019B960494DF}">
-                <a14:hiddenLine xmlns:a14="http://schemas.microsoft.com/office/drawing/2010/main" xmlns="" w="9525">
+                <a14:hiddenLine xmlns="" xmlns:a14="http://schemas.microsoft.com/office/drawing/2010/main" w="9525">
                   <a:solidFill>
                     <a:srgbClr val="000000"/>
                   </a:solidFill>
@@ -3238,7 +3238,7 @@
             </a:ln>
             <a:extLst>
               <a:ext uri="{91240B29-F687-4f45-9708-019B960494DF}">
-                <a14:hiddenLine xmlns:a14="http://schemas.microsoft.com/office/drawing/2010/main" xmlns="" w="9525">
+                <a14:hiddenLine xmlns="" xmlns:a14="http://schemas.microsoft.com/office/drawing/2010/main" w="9525">
                   <a:solidFill>
                     <a:srgbClr val="000000"/>
                   </a:solidFill>
@@ -3303,7 +3303,7 @@
             </a:ln>
             <a:extLst>
               <a:ext uri="{91240B29-F687-4f45-9708-019B960494DF}">
-                <a14:hiddenLine xmlns:a14="http://schemas.microsoft.com/office/drawing/2010/main" xmlns="" w="9525">
+                <a14:hiddenLine xmlns="" xmlns:a14="http://schemas.microsoft.com/office/drawing/2010/main" w="9525">
                   <a:solidFill>
                     <a:srgbClr val="000000"/>
                   </a:solidFill>
@@ -3393,7 +3393,7 @@
             </a:ln>
             <a:extLst>
               <a:ext uri="{91240B29-F687-4f45-9708-019B960494DF}">
-                <a14:hiddenLine xmlns:a14="http://schemas.microsoft.com/office/drawing/2010/main" xmlns="" w="9525">
+                <a14:hiddenLine xmlns="" xmlns:a14="http://schemas.microsoft.com/office/drawing/2010/main" w="9525">
                   <a:solidFill>
                     <a:srgbClr val="000000"/>
                   </a:solidFill>
@@ -3455,7 +3455,7 @@
             </a:ln>
             <a:extLst>
               <a:ext uri="{91240B29-F687-4f45-9708-019B960494DF}">
-                <a14:hiddenLine xmlns:a14="http://schemas.microsoft.com/office/drawing/2010/main" xmlns="" w="9525">
+                <a14:hiddenLine xmlns="" xmlns:a14="http://schemas.microsoft.com/office/drawing/2010/main" w="9525">
                   <a:solidFill>
                     <a:srgbClr val="000000"/>
                   </a:solidFill>
@@ -3545,7 +3545,7 @@
             </a:ln>
             <a:extLst>
               <a:ext uri="{91240B29-F687-4f45-9708-019B960494DF}">
-                <a14:hiddenLine xmlns:a14="http://schemas.microsoft.com/office/drawing/2010/main" xmlns="" w="9525">
+                <a14:hiddenLine xmlns="" xmlns:a14="http://schemas.microsoft.com/office/drawing/2010/main" w="9525">
                   <a:solidFill>
                     <a:srgbClr val="000000"/>
                   </a:solidFill>
@@ -3635,7 +3635,7 @@
             </a:ln>
             <a:extLst>
               <a:ext uri="{91240B29-F687-4f45-9708-019B960494DF}">
-                <a14:hiddenLine xmlns:a14="http://schemas.microsoft.com/office/drawing/2010/main" xmlns="" w="9525">
+                <a14:hiddenLine xmlns="" xmlns:a14="http://schemas.microsoft.com/office/drawing/2010/main" w="9525">
                   <a:solidFill>
                     <a:srgbClr val="000000"/>
                   </a:solidFill>
@@ -3700,7 +3700,7 @@
             </a:ln>
             <a:extLst>
               <a:ext uri="{91240B29-F687-4f45-9708-019B960494DF}">
-                <a14:hiddenLine xmlns:a14="http://schemas.microsoft.com/office/drawing/2010/main" xmlns="" w="9525">
+                <a14:hiddenLine xmlns="" xmlns:a14="http://schemas.microsoft.com/office/drawing/2010/main" w="9525">
                   <a:solidFill>
                     <a:srgbClr val="000000"/>
                   </a:solidFill>
@@ -3762,7 +3762,7 @@
             </a:ln>
             <a:extLst>
               <a:ext uri="{91240B29-F687-4f45-9708-019B960494DF}">
-                <a14:hiddenLine xmlns:a14="http://schemas.microsoft.com/office/drawing/2010/main" xmlns="" w="9525">
+                <a14:hiddenLine xmlns="" xmlns:a14="http://schemas.microsoft.com/office/drawing/2010/main" w="9525">
                   <a:solidFill>
                     <a:srgbClr val="000000"/>
                   </a:solidFill>
@@ -3852,7 +3852,7 @@
             </a:ln>
             <a:extLst>
               <a:ext uri="{91240B29-F687-4f45-9708-019B960494DF}">
-                <a14:hiddenLine xmlns:a14="http://schemas.microsoft.com/office/drawing/2010/main" xmlns="" w="9525">
+                <a14:hiddenLine xmlns="" xmlns:a14="http://schemas.microsoft.com/office/drawing/2010/main" w="9525">
                   <a:solidFill>
                     <a:srgbClr val="000000"/>
                   </a:solidFill>
@@ -3942,7 +3942,7 @@
             </a:ln>
             <a:extLst>
               <a:ext uri="{91240B29-F687-4f45-9708-019B960494DF}">
-                <a14:hiddenLine xmlns:a14="http://schemas.microsoft.com/office/drawing/2010/main" xmlns="" w="9525">
+                <a14:hiddenLine xmlns="" xmlns:a14="http://schemas.microsoft.com/office/drawing/2010/main" w="9525">
                   <a:solidFill>
                     <a:srgbClr val="000000"/>
                   </a:solidFill>
@@ -4004,7 +4004,7 @@
             </a:ln>
             <a:extLst>
               <a:ext uri="{91240B29-F687-4f45-9708-019B960494DF}">
-                <a14:hiddenLine xmlns:a14="http://schemas.microsoft.com/office/drawing/2010/main" xmlns="" w="9525">
+                <a14:hiddenLine xmlns="" xmlns:a14="http://schemas.microsoft.com/office/drawing/2010/main" w="9525">
                   <a:solidFill>
                     <a:srgbClr val="000000"/>
                   </a:solidFill>
@@ -4124,7 +4124,7 @@
             </a:ln>
             <a:extLst>
               <a:ext uri="{91240B29-F687-4f45-9708-019B960494DF}">
-                <a14:hiddenLine xmlns:a14="http://schemas.microsoft.com/office/drawing/2010/main" xmlns="" w="9525">
+                <a14:hiddenLine xmlns="" xmlns:a14="http://schemas.microsoft.com/office/drawing/2010/main" w="9525">
                   <a:solidFill>
                     <a:srgbClr val="000000"/>
                   </a:solidFill>
@@ -4192,7 +4192,7 @@
             </a:ln>
             <a:extLst>
               <a:ext uri="{91240B29-F687-4f45-9708-019B960494DF}">
-                <a14:hiddenLine xmlns:a14="http://schemas.microsoft.com/office/drawing/2010/main" xmlns="" w="9525">
+                <a14:hiddenLine xmlns="" xmlns:a14="http://schemas.microsoft.com/office/drawing/2010/main" w="9525">
                   <a:solidFill>
                     <a:srgbClr val="000000"/>
                   </a:solidFill>
@@ -4282,7 +4282,7 @@
             </a:ln>
             <a:extLst>
               <a:ext uri="{91240B29-F687-4f45-9708-019B960494DF}">
-                <a14:hiddenLine xmlns:a14="http://schemas.microsoft.com/office/drawing/2010/main" xmlns="" w="9525">
+                <a14:hiddenLine xmlns="" xmlns:a14="http://schemas.microsoft.com/office/drawing/2010/main" w="9525">
                   <a:solidFill>
                     <a:srgbClr val="000000"/>
                   </a:solidFill>
@@ -4422,7 +4422,7 @@
           <a:p>
             <a:fld id="{6A8C1F66-F627-47B8-820F-0CD0469635B7}" type="datetimeFigureOut">
               <a:rPr lang="en-CA" smtClean="0"/>
-              <a:t>2018-01-24</a:t>
+              <a:t>2018-01-25</a:t>
             </a:fld>
             <a:endParaRPr lang="en-CA"/>
           </a:p>
@@ -4689,7 +4689,7 @@
           <a:p>
             <a:fld id="{6A8C1F66-F627-47B8-820F-0CD0469635B7}" type="datetimeFigureOut">
               <a:rPr lang="en-CA" smtClean="0"/>
-              <a:t>2018-01-24</a:t>
+              <a:t>2018-01-25</a:t>
             </a:fld>
             <a:endParaRPr lang="en-CA"/>
           </a:p>
@@ -4885,7 +4885,7 @@
           <a:p>
             <a:fld id="{6A8C1F66-F627-47B8-820F-0CD0469635B7}" type="datetimeFigureOut">
               <a:rPr lang="en-CA" smtClean="0"/>
-              <a:t>2018-01-24</a:t>
+              <a:t>2018-01-25</a:t>
             </a:fld>
             <a:endParaRPr lang="en-CA"/>
           </a:p>
@@ -5148,7 +5148,7 @@
           <a:p>
             <a:fld id="{6A8C1F66-F627-47B8-820F-0CD0469635B7}" type="datetimeFigureOut">
               <a:rPr lang="en-CA" smtClean="0"/>
-              <a:t>2018-01-24</a:t>
+              <a:t>2018-01-25</a:t>
             </a:fld>
             <a:endParaRPr lang="en-CA"/>
           </a:p>
@@ -5582,7 +5582,7 @@
           <a:p>
             <a:fld id="{6A8C1F66-F627-47B8-820F-0CD0469635B7}" type="datetimeFigureOut">
               <a:rPr lang="en-CA" smtClean="0"/>
-              <a:t>2018-01-24</a:t>
+              <a:t>2018-01-25</a:t>
             </a:fld>
             <a:endParaRPr lang="en-CA"/>
           </a:p>
@@ -6128,7 +6128,7 @@
           <a:p>
             <a:fld id="{6A8C1F66-F627-47B8-820F-0CD0469635B7}" type="datetimeFigureOut">
               <a:rPr lang="en-CA" smtClean="0"/>
-              <a:t>2018-01-24</a:t>
+              <a:t>2018-01-25</a:t>
             </a:fld>
             <a:endParaRPr lang="en-CA"/>
           </a:p>
@@ -6848,7 +6848,7 @@
           <a:p>
             <a:fld id="{6A8C1F66-F627-47B8-820F-0CD0469635B7}" type="datetimeFigureOut">
               <a:rPr lang="en-CA" smtClean="0"/>
-              <a:t>2018-01-24</a:t>
+              <a:t>2018-01-25</a:t>
             </a:fld>
             <a:endParaRPr lang="en-CA"/>
           </a:p>
@@ -7018,7 +7018,7 @@
           <a:p>
             <a:fld id="{6A8C1F66-F627-47B8-820F-0CD0469635B7}" type="datetimeFigureOut">
               <a:rPr lang="en-CA" smtClean="0"/>
-              <a:t>2018-01-24</a:t>
+              <a:t>2018-01-25</a:t>
             </a:fld>
             <a:endParaRPr lang="en-CA"/>
           </a:p>
@@ -7198,7 +7198,7 @@
           <a:p>
             <a:fld id="{6A8C1F66-F627-47B8-820F-0CD0469635B7}" type="datetimeFigureOut">
               <a:rPr lang="en-CA" smtClean="0"/>
-              <a:t>2018-01-24</a:t>
+              <a:t>2018-01-25</a:t>
             </a:fld>
             <a:endParaRPr lang="en-CA"/>
           </a:p>
@@ -7368,7 +7368,7 @@
           <a:p>
             <a:fld id="{6A8C1F66-F627-47B8-820F-0CD0469635B7}" type="datetimeFigureOut">
               <a:rPr lang="en-CA" smtClean="0"/>
-              <a:t>2018-01-24</a:t>
+              <a:t>2018-01-25</a:t>
             </a:fld>
             <a:endParaRPr lang="en-CA"/>
           </a:p>
@@ -7618,7 +7618,7 @@
           <a:p>
             <a:fld id="{6A8C1F66-F627-47B8-820F-0CD0469635B7}" type="datetimeFigureOut">
               <a:rPr lang="en-CA" smtClean="0"/>
-              <a:t>2018-01-24</a:t>
+              <a:t>2018-01-25</a:t>
             </a:fld>
             <a:endParaRPr lang="en-CA"/>
           </a:p>
@@ -7850,7 +7850,7 @@
           <a:p>
             <a:fld id="{6A8C1F66-F627-47B8-820F-0CD0469635B7}" type="datetimeFigureOut">
               <a:rPr lang="en-CA" smtClean="0"/>
-              <a:t>2018-01-24</a:t>
+              <a:t>2018-01-25</a:t>
             </a:fld>
             <a:endParaRPr lang="en-CA"/>
           </a:p>
@@ -8231,7 +8231,7 @@
           <a:p>
             <a:fld id="{6A8C1F66-F627-47B8-820F-0CD0469635B7}" type="datetimeFigureOut">
               <a:rPr lang="en-CA" smtClean="0"/>
-              <a:t>2018-01-24</a:t>
+              <a:t>2018-01-25</a:t>
             </a:fld>
             <a:endParaRPr lang="en-CA"/>
           </a:p>
@@ -8349,7 +8349,7 @@
           <a:p>
             <a:fld id="{6A8C1F66-F627-47B8-820F-0CD0469635B7}" type="datetimeFigureOut">
               <a:rPr lang="en-CA" smtClean="0"/>
-              <a:t>2018-01-24</a:t>
+              <a:t>2018-01-25</a:t>
             </a:fld>
             <a:endParaRPr lang="en-CA"/>
           </a:p>
@@ -8444,7 +8444,7 @@
           <a:p>
             <a:fld id="{6A8C1F66-F627-47B8-820F-0CD0469635B7}" type="datetimeFigureOut">
               <a:rPr lang="en-CA" smtClean="0"/>
-              <a:t>2018-01-24</a:t>
+              <a:t>2018-01-25</a:t>
             </a:fld>
             <a:endParaRPr lang="en-CA"/>
           </a:p>
@@ -8693,7 +8693,7 @@
           <a:p>
             <a:fld id="{6A8C1F66-F627-47B8-820F-0CD0469635B7}" type="datetimeFigureOut">
               <a:rPr lang="en-CA" smtClean="0"/>
-              <a:t>2018-01-24</a:t>
+              <a:t>2018-01-25</a:t>
             </a:fld>
             <a:endParaRPr lang="en-CA"/>
           </a:p>
@@ -8973,7 +8973,7 @@
           <a:p>
             <a:fld id="{6A8C1F66-F627-47B8-820F-0CD0469635B7}" type="datetimeFigureOut">
               <a:rPr lang="en-CA" smtClean="0"/>
-              <a:t>2018-01-24</a:t>
+              <a:t>2018-01-25</a:t>
             </a:fld>
             <a:endParaRPr lang="en-CA"/>
           </a:p>
@@ -9089,7 +9089,7 @@
           <a:noFill/>
           <a:extLst>
             <a:ext uri="{909E8E84-426E-40dd-AFC4-6F175D3DCCD1}">
-              <a14:hiddenFill xmlns:a14="http://schemas.microsoft.com/office/drawing/2010/main" xmlns="">
+              <a14:hiddenFill xmlns="" xmlns:a14="http://schemas.microsoft.com/office/drawing/2010/main">
                 <a:solidFill>
                   <a:srgbClr val="FFFFFF"/>
                 </a:solidFill>
@@ -9163,7 +9163,7 @@
               </a:ln>
               <a:extLst>
                 <a:ext uri="{91240B29-F687-4f45-9708-019B960494DF}">
-                  <a14:hiddenLine xmlns:a14="http://schemas.microsoft.com/office/drawing/2010/main" xmlns="" w="9525">
+                  <a14:hiddenLine xmlns="" xmlns:a14="http://schemas.microsoft.com/office/drawing/2010/main" w="9525">
                     <a:solidFill>
                       <a:srgbClr val="000000"/>
                     </a:solidFill>
@@ -9253,7 +9253,7 @@
               </a:ln>
               <a:extLst>
                 <a:ext uri="{91240B29-F687-4f45-9708-019B960494DF}">
-                  <a14:hiddenLine xmlns:a14="http://schemas.microsoft.com/office/drawing/2010/main" xmlns="" w="9525">
+                  <a14:hiddenLine xmlns="" xmlns:a14="http://schemas.microsoft.com/office/drawing/2010/main" w="9525">
                     <a:solidFill>
                       <a:srgbClr val="000000"/>
                     </a:solidFill>
@@ -9343,7 +9343,7 @@
               </a:ln>
               <a:extLst>
                 <a:ext uri="{91240B29-F687-4f45-9708-019B960494DF}">
-                  <a14:hiddenLine xmlns:a14="http://schemas.microsoft.com/office/drawing/2010/main" xmlns="" w="9525">
+                  <a14:hiddenLine xmlns="" xmlns:a14="http://schemas.microsoft.com/office/drawing/2010/main" w="9525">
                     <a:solidFill>
                       <a:srgbClr val="000000"/>
                     </a:solidFill>
@@ -9405,7 +9405,7 @@
               </a:ln>
               <a:extLst>
                 <a:ext uri="{91240B29-F687-4f45-9708-019B960494DF}">
-                  <a14:hiddenLine xmlns:a14="http://schemas.microsoft.com/office/drawing/2010/main" xmlns="" w="9525">
+                  <a14:hiddenLine xmlns="" xmlns:a14="http://schemas.microsoft.com/office/drawing/2010/main" w="9525">
                     <a:solidFill>
                       <a:srgbClr val="000000"/>
                     </a:solidFill>
@@ -9495,7 +9495,7 @@
               </a:ln>
               <a:extLst>
                 <a:ext uri="{91240B29-F687-4f45-9708-019B960494DF}">
-                  <a14:hiddenLine xmlns:a14="http://schemas.microsoft.com/office/drawing/2010/main" xmlns="" w="9525">
+                  <a14:hiddenLine xmlns="" xmlns:a14="http://schemas.microsoft.com/office/drawing/2010/main" w="9525">
                     <a:solidFill>
                       <a:srgbClr val="000000"/>
                     </a:solidFill>
@@ -9557,7 +9557,7 @@
               </a:ln>
               <a:extLst>
                 <a:ext uri="{91240B29-F687-4f45-9708-019B960494DF}">
-                  <a14:hiddenLine xmlns:a14="http://schemas.microsoft.com/office/drawing/2010/main" xmlns="" w="9525">
+                  <a14:hiddenLine xmlns="" xmlns:a14="http://schemas.microsoft.com/office/drawing/2010/main" w="9525">
                     <a:solidFill>
                       <a:srgbClr val="000000"/>
                     </a:solidFill>
@@ -9619,7 +9619,7 @@
               </a:ln>
               <a:extLst>
                 <a:ext uri="{91240B29-F687-4f45-9708-019B960494DF}">
-                  <a14:hiddenLine xmlns:a14="http://schemas.microsoft.com/office/drawing/2010/main" xmlns="" w="9525">
+                  <a14:hiddenLine xmlns="" xmlns:a14="http://schemas.microsoft.com/office/drawing/2010/main" w="9525">
                     <a:solidFill>
                       <a:srgbClr val="000000"/>
                     </a:solidFill>
@@ -9709,7 +9709,7 @@
               </a:ln>
               <a:extLst>
                 <a:ext uri="{91240B29-F687-4f45-9708-019B960494DF}">
-                  <a14:hiddenLine xmlns:a14="http://schemas.microsoft.com/office/drawing/2010/main" xmlns="" w="9525">
+                  <a14:hiddenLine xmlns="" xmlns:a14="http://schemas.microsoft.com/office/drawing/2010/main" w="9525">
                     <a:solidFill>
                       <a:srgbClr val="000000"/>
                     </a:solidFill>
@@ -9799,7 +9799,7 @@
               </a:ln>
               <a:extLst>
                 <a:ext uri="{91240B29-F687-4f45-9708-019B960494DF}">
-                  <a14:hiddenLine xmlns:a14="http://schemas.microsoft.com/office/drawing/2010/main" xmlns="" w="9525">
+                  <a14:hiddenLine xmlns="" xmlns:a14="http://schemas.microsoft.com/office/drawing/2010/main" w="9525">
                     <a:solidFill>
                       <a:srgbClr val="000000"/>
                     </a:solidFill>
@@ -9861,7 +9861,7 @@
               </a:ln>
               <a:extLst>
                 <a:ext uri="{91240B29-F687-4f45-9708-019B960494DF}">
-                  <a14:hiddenLine xmlns:a14="http://schemas.microsoft.com/office/drawing/2010/main" xmlns="" w="9525">
+                  <a14:hiddenLine xmlns="" xmlns:a14="http://schemas.microsoft.com/office/drawing/2010/main" w="9525">
                     <a:solidFill>
                       <a:srgbClr val="000000"/>
                     </a:solidFill>
@@ -9971,7 +9971,7 @@
               </a:ln>
               <a:extLst>
                 <a:ext uri="{91240B29-F687-4f45-9708-019B960494DF}">
-                  <a14:hiddenLine xmlns:a14="http://schemas.microsoft.com/office/drawing/2010/main" xmlns="" w="9525">
+                  <a14:hiddenLine xmlns="" xmlns:a14="http://schemas.microsoft.com/office/drawing/2010/main" w="9525">
                     <a:solidFill>
                       <a:srgbClr val="000000"/>
                     </a:solidFill>
@@ -10055,7 +10055,7 @@
               </a:ln>
               <a:extLst>
                 <a:ext uri="{91240B29-F687-4f45-9708-019B960494DF}">
-                  <a14:hiddenLine xmlns:a14="http://schemas.microsoft.com/office/drawing/2010/main" xmlns="" w="9525">
+                  <a14:hiddenLine xmlns="" xmlns:a14="http://schemas.microsoft.com/office/drawing/2010/main" w="9525">
                     <a:solidFill>
                       <a:srgbClr val="000000"/>
                     </a:solidFill>
@@ -10117,7 +10117,7 @@
               </a:ln>
               <a:extLst>
                 <a:ext uri="{91240B29-F687-4f45-9708-019B960494DF}">
-                  <a14:hiddenLine xmlns:a14="http://schemas.microsoft.com/office/drawing/2010/main" xmlns="" w="9525">
+                  <a14:hiddenLine xmlns="" xmlns:a14="http://schemas.microsoft.com/office/drawing/2010/main" w="9525">
                     <a:solidFill>
                       <a:srgbClr val="000000"/>
                     </a:solidFill>
@@ -10179,7 +10179,7 @@
               </a:ln>
               <a:extLst>
                 <a:ext uri="{91240B29-F687-4f45-9708-019B960494DF}">
-                  <a14:hiddenLine xmlns:a14="http://schemas.microsoft.com/office/drawing/2010/main" xmlns="" w="9525">
+                  <a14:hiddenLine xmlns="" xmlns:a14="http://schemas.microsoft.com/office/drawing/2010/main" w="9525">
                     <a:solidFill>
                       <a:srgbClr val="000000"/>
                     </a:solidFill>
@@ -10269,7 +10269,7 @@
               </a:ln>
               <a:extLst>
                 <a:ext uri="{91240B29-F687-4f45-9708-019B960494DF}">
-                  <a14:hiddenLine xmlns:a14="http://schemas.microsoft.com/office/drawing/2010/main" xmlns="" w="9525">
+                  <a14:hiddenLine xmlns="" xmlns:a14="http://schemas.microsoft.com/office/drawing/2010/main" w="9525">
                     <a:solidFill>
                       <a:srgbClr val="000000"/>
                     </a:solidFill>
@@ -10303,7 +10303,7 @@
               </a:ln>
               <a:extLst>
                 <a:ext uri="{91240B29-F687-4f45-9708-019B960494DF}">
-                  <a14:hiddenLine xmlns:a14="http://schemas.microsoft.com/office/drawing/2010/main" xmlns="" w="9525">
+                  <a14:hiddenLine xmlns="" xmlns:a14="http://schemas.microsoft.com/office/drawing/2010/main" w="9525">
                     <a:solidFill>
                       <a:srgbClr val="000000"/>
                     </a:solidFill>
@@ -10368,7 +10368,7 @@
               </a:ln>
               <a:extLst>
                 <a:ext uri="{91240B29-F687-4f45-9708-019B960494DF}">
-                  <a14:hiddenLine xmlns:a14="http://schemas.microsoft.com/office/drawing/2010/main" xmlns="" w="9525">
+                  <a14:hiddenLine xmlns="" xmlns:a14="http://schemas.microsoft.com/office/drawing/2010/main" w="9525">
                     <a:solidFill>
                       <a:srgbClr val="000000"/>
                     </a:solidFill>
@@ -10458,7 +10458,7 @@
               </a:ln>
               <a:extLst>
                 <a:ext uri="{91240B29-F687-4f45-9708-019B960494DF}">
-                  <a14:hiddenLine xmlns:a14="http://schemas.microsoft.com/office/drawing/2010/main" xmlns="" w="9525">
+                  <a14:hiddenLine xmlns="" xmlns:a14="http://schemas.microsoft.com/office/drawing/2010/main" w="9525">
                     <a:solidFill>
                       <a:srgbClr val="000000"/>
                     </a:solidFill>
@@ -10520,7 +10520,7 @@
               </a:ln>
               <a:extLst>
                 <a:ext uri="{91240B29-F687-4f45-9708-019B960494DF}">
-                  <a14:hiddenLine xmlns:a14="http://schemas.microsoft.com/office/drawing/2010/main" xmlns="" w="9525">
+                  <a14:hiddenLine xmlns="" xmlns:a14="http://schemas.microsoft.com/office/drawing/2010/main" w="9525">
                     <a:solidFill>
                       <a:srgbClr val="000000"/>
                     </a:solidFill>
@@ -10610,7 +10610,7 @@
               </a:ln>
               <a:extLst>
                 <a:ext uri="{91240B29-F687-4f45-9708-019B960494DF}">
-                  <a14:hiddenLine xmlns:a14="http://schemas.microsoft.com/office/drawing/2010/main" xmlns="" w="9525">
+                  <a14:hiddenLine xmlns="" xmlns:a14="http://schemas.microsoft.com/office/drawing/2010/main" w="9525">
                     <a:solidFill>
                       <a:srgbClr val="000000"/>
                     </a:solidFill>
@@ -10675,7 +10675,7 @@
               </a:ln>
               <a:extLst>
                 <a:ext uri="{91240B29-F687-4f45-9708-019B960494DF}">
-                  <a14:hiddenLine xmlns:a14="http://schemas.microsoft.com/office/drawing/2010/main" xmlns="" w="9525">
+                  <a14:hiddenLine xmlns="" xmlns:a14="http://schemas.microsoft.com/office/drawing/2010/main" w="9525">
                     <a:solidFill>
                       <a:srgbClr val="000000"/>
                     </a:solidFill>
@@ -10737,7 +10737,7 @@
               </a:ln>
               <a:extLst>
                 <a:ext uri="{91240B29-F687-4f45-9708-019B960494DF}">
-                  <a14:hiddenLine xmlns:a14="http://schemas.microsoft.com/office/drawing/2010/main" xmlns="" w="9525">
+                  <a14:hiddenLine xmlns="" xmlns:a14="http://schemas.microsoft.com/office/drawing/2010/main" w="9525">
                     <a:solidFill>
                       <a:srgbClr val="000000"/>
                     </a:solidFill>
@@ -10827,7 +10827,7 @@
               </a:ln>
               <a:extLst>
                 <a:ext uri="{91240B29-F687-4f45-9708-019B960494DF}">
-                  <a14:hiddenLine xmlns:a14="http://schemas.microsoft.com/office/drawing/2010/main" xmlns="" w="9525">
+                  <a14:hiddenLine xmlns="" xmlns:a14="http://schemas.microsoft.com/office/drawing/2010/main" w="9525">
                     <a:solidFill>
                       <a:srgbClr val="000000"/>
                     </a:solidFill>
@@ -10917,7 +10917,7 @@
               </a:ln>
               <a:extLst>
                 <a:ext uri="{91240B29-F687-4f45-9708-019B960494DF}">
-                  <a14:hiddenLine xmlns:a14="http://schemas.microsoft.com/office/drawing/2010/main" xmlns="" w="9525">
+                  <a14:hiddenLine xmlns="" xmlns:a14="http://schemas.microsoft.com/office/drawing/2010/main" w="9525">
                     <a:solidFill>
                       <a:srgbClr val="000000"/>
                     </a:solidFill>
@@ -10982,7 +10982,7 @@
               </a:ln>
               <a:extLst>
                 <a:ext uri="{91240B29-F687-4f45-9708-019B960494DF}">
-                  <a14:hiddenLine xmlns:a14="http://schemas.microsoft.com/office/drawing/2010/main" xmlns="" w="9525">
+                  <a14:hiddenLine xmlns="" xmlns:a14="http://schemas.microsoft.com/office/drawing/2010/main" w="9525">
                     <a:solidFill>
                       <a:srgbClr val="000000"/>
                     </a:solidFill>
@@ -11102,7 +11102,7 @@
               </a:ln>
               <a:extLst>
                 <a:ext uri="{91240B29-F687-4f45-9708-019B960494DF}">
-                  <a14:hiddenLine xmlns:a14="http://schemas.microsoft.com/office/drawing/2010/main" xmlns="" w="9525">
+                  <a14:hiddenLine xmlns="" xmlns:a14="http://schemas.microsoft.com/office/drawing/2010/main" w="9525">
                     <a:solidFill>
                       <a:srgbClr val="000000"/>
                     </a:solidFill>
@@ -11200,7 +11200,7 @@
               </a:ln>
               <a:extLst>
                 <a:ext uri="{91240B29-F687-4f45-9708-019B960494DF}">
-                  <a14:hiddenLine xmlns:a14="http://schemas.microsoft.com/office/drawing/2010/main" xmlns="" w="9525">
+                  <a14:hiddenLine xmlns="" xmlns:a14="http://schemas.microsoft.com/office/drawing/2010/main" w="9525">
                     <a:solidFill>
                       <a:srgbClr val="000000"/>
                     </a:solidFill>
@@ -11315,7 +11315,7 @@
               </a:ln>
               <a:extLst>
                 <a:ext uri="{91240B29-F687-4f45-9708-019B960494DF}">
-                  <a14:hiddenLine xmlns:a14="http://schemas.microsoft.com/office/drawing/2010/main" xmlns="" w="9525">
+                  <a14:hiddenLine xmlns="" xmlns:a14="http://schemas.microsoft.com/office/drawing/2010/main" w="9525">
                     <a:solidFill>
                       <a:srgbClr val="000000"/>
                     </a:solidFill>
@@ -11405,7 +11405,7 @@
               </a:ln>
               <a:extLst>
                 <a:ext uri="{91240B29-F687-4f45-9708-019B960494DF}">
-                  <a14:hiddenLine xmlns:a14="http://schemas.microsoft.com/office/drawing/2010/main" xmlns="" w="9525">
+                  <a14:hiddenLine xmlns="" xmlns:a14="http://schemas.microsoft.com/office/drawing/2010/main" w="9525">
                     <a:solidFill>
                       <a:srgbClr val="000000"/>
                     </a:solidFill>
@@ -11470,7 +11470,7 @@
               </a:ln>
               <a:extLst>
                 <a:ext uri="{91240B29-F687-4f45-9708-019B960494DF}">
-                  <a14:hiddenLine xmlns:a14="http://schemas.microsoft.com/office/drawing/2010/main" xmlns="" w="9525">
+                  <a14:hiddenLine xmlns="" xmlns:a14="http://schemas.microsoft.com/office/drawing/2010/main" w="9525">
                     <a:solidFill>
                       <a:srgbClr val="000000"/>
                     </a:solidFill>
@@ -11560,7 +11560,7 @@
               </a:ln>
               <a:extLst>
                 <a:ext uri="{91240B29-F687-4f45-9708-019B960494DF}">
-                  <a14:hiddenLine xmlns:a14="http://schemas.microsoft.com/office/drawing/2010/main" xmlns="" w="9525">
+                  <a14:hiddenLine xmlns="" xmlns:a14="http://schemas.microsoft.com/office/drawing/2010/main" w="9525">
                     <a:solidFill>
                       <a:srgbClr val="000000"/>
                     </a:solidFill>
@@ -11628,7 +11628,7 @@
               </a:ln>
               <a:extLst>
                 <a:ext uri="{91240B29-F687-4f45-9708-019B960494DF}">
-                  <a14:hiddenLine xmlns:a14="http://schemas.microsoft.com/office/drawing/2010/main" xmlns="" w="9525">
+                  <a14:hiddenLine xmlns="" xmlns:a14="http://schemas.microsoft.com/office/drawing/2010/main" w="9525">
                     <a:solidFill>
                       <a:srgbClr val="000000"/>
                     </a:solidFill>
@@ -11718,7 +11718,7 @@
               </a:ln>
               <a:extLst>
                 <a:ext uri="{91240B29-F687-4f45-9708-019B960494DF}">
-                  <a14:hiddenLine xmlns:a14="http://schemas.microsoft.com/office/drawing/2010/main" xmlns="" w="9525">
+                  <a14:hiddenLine xmlns="" xmlns:a14="http://schemas.microsoft.com/office/drawing/2010/main" w="9525">
                     <a:solidFill>
                       <a:srgbClr val="000000"/>
                     </a:solidFill>
@@ -11786,7 +11786,7 @@
               </a:ln>
               <a:extLst>
                 <a:ext uri="{91240B29-F687-4f45-9708-019B960494DF}">
-                  <a14:hiddenLine xmlns:a14="http://schemas.microsoft.com/office/drawing/2010/main" xmlns="" w="9525">
+                  <a14:hiddenLine xmlns="" xmlns:a14="http://schemas.microsoft.com/office/drawing/2010/main" w="9525">
                     <a:solidFill>
                       <a:srgbClr val="000000"/>
                     </a:solidFill>
@@ -11876,7 +11876,7 @@
               </a:ln>
               <a:extLst>
                 <a:ext uri="{91240B29-F687-4f45-9708-019B960494DF}">
-                  <a14:hiddenLine xmlns:a14="http://schemas.microsoft.com/office/drawing/2010/main" xmlns="" w="9525">
+                  <a14:hiddenLine xmlns="" xmlns:a14="http://schemas.microsoft.com/office/drawing/2010/main" w="9525">
                     <a:solidFill>
                       <a:srgbClr val="000000"/>
                     </a:solidFill>
@@ -11910,7 +11910,7 @@
               </a:ln>
               <a:extLst>
                 <a:ext uri="{91240B29-F687-4f45-9708-019B960494DF}">
-                  <a14:hiddenLine xmlns:a14="http://schemas.microsoft.com/office/drawing/2010/main" xmlns="" w="9525">
+                  <a14:hiddenLine xmlns="" xmlns:a14="http://schemas.microsoft.com/office/drawing/2010/main" w="9525">
                     <a:solidFill>
                       <a:srgbClr val="000000"/>
                     </a:solidFill>
@@ -12050,7 +12050,7 @@
           <a:p>
             <a:fld id="{6A8C1F66-F627-47B8-820F-0CD0469635B7}" type="datetimeFigureOut">
               <a:rPr lang="en-CA" smtClean="0"/>
-              <a:t>2018-01-24</a:t>
+              <a:t>2018-01-25</a:t>
             </a:fld>
             <a:endParaRPr lang="en-CA"/>
           </a:p>
@@ -12475,7 +12475,7 @@
           <p:cNvPr id="3" name="Subtitle 2">
             <a:extLst>
               <a:ext uri="{FF2B5EF4-FFF2-40B4-BE49-F238E27FC236}">
-                <a16:creationId xmlns="" xmlns:a16="http://schemas.microsoft.com/office/drawing/2014/main" id="{0B64D96F-A1EA-4A3F-A362-50387D704DD6}"/>
+                <a16:creationId xmlns:a16="http://schemas.microsoft.com/office/drawing/2014/main" id="{0B64D96F-A1EA-4A3F-A362-50387D704DD6}"/>
               </a:ext>
             </a:extLst>
           </p:cNvPr>
@@ -12527,7 +12527,7 @@
           <p:cNvPr id="4" name="Title 1">
             <a:extLst>
               <a:ext uri="{FF2B5EF4-FFF2-40B4-BE49-F238E27FC236}">
-                <a16:creationId xmlns="" xmlns:a16="http://schemas.microsoft.com/office/drawing/2014/main" id="{6908F941-37CE-46C5-9607-BAA126AEA790}"/>
+                <a16:creationId xmlns:a16="http://schemas.microsoft.com/office/drawing/2014/main" id="{6908F941-37CE-46C5-9607-BAA126AEA790}"/>
               </a:ext>
             </a:extLst>
           </p:cNvPr>
@@ -12586,13 +12586,6 @@
   <p:clrMapOvr>
     <a:masterClrMapping/>
   </p:clrMapOvr>
-  <p:timing>
-    <p:tnLst>
-      <p:par>
-        <p:cTn id="1" dur="indefinite" restart="never" nodeType="tmRoot"/>
-      </p:par>
-    </p:tnLst>
-  </p:timing>
 </p:sld>
 </file>
 
@@ -12618,7 +12611,7 @@
           <p:cNvPr id="2" name="Title 1">
             <a:extLst>
               <a:ext uri="{FF2B5EF4-FFF2-40B4-BE49-F238E27FC236}">
-                <a16:creationId xmlns="" xmlns:a16="http://schemas.microsoft.com/office/drawing/2014/main" id="{B16A5571-C585-4212-909F-22EFA13187D4}"/>
+                <a16:creationId xmlns:a16="http://schemas.microsoft.com/office/drawing/2014/main" id="{B16A5571-C585-4212-909F-22EFA13187D4}"/>
               </a:ext>
             </a:extLst>
           </p:cNvPr>
@@ -12695,13 +12688,6 @@
   <p:clrMapOvr>
     <a:masterClrMapping/>
   </p:clrMapOvr>
-  <p:timing>
-    <p:tnLst>
-      <p:par>
-        <p:cTn id="1" dur="indefinite" restart="never" nodeType="tmRoot"/>
-      </p:par>
-    </p:tnLst>
-  </p:timing>
 </p:sld>
 </file>
 
@@ -12727,7 +12713,7 @@
           <p:cNvPr id="2" name="Title 1">
             <a:extLst>
               <a:ext uri="{FF2B5EF4-FFF2-40B4-BE49-F238E27FC236}">
-                <a16:creationId xmlns="" xmlns:a16="http://schemas.microsoft.com/office/drawing/2014/main" id="{0FB82A53-AAA3-404D-BA57-D56AB9FCF759}"/>
+                <a16:creationId xmlns:a16="http://schemas.microsoft.com/office/drawing/2014/main" id="{0FB82A53-AAA3-404D-BA57-D56AB9FCF759}"/>
               </a:ext>
             </a:extLst>
           </p:cNvPr>
@@ -12756,7 +12742,7 @@
           <p:cNvPr id="3" name="Content Placeholder 2">
             <a:extLst>
               <a:ext uri="{FF2B5EF4-FFF2-40B4-BE49-F238E27FC236}">
-                <a16:creationId xmlns="" xmlns:a16="http://schemas.microsoft.com/office/drawing/2014/main" id="{9EF5AC7C-CAB4-4B13-B9B0-17EF00FDBDA8}"/>
+                <a16:creationId xmlns:a16="http://schemas.microsoft.com/office/drawing/2014/main" id="{9EF5AC7C-CAB4-4B13-B9B0-17EF00FDBDA8}"/>
               </a:ext>
             </a:extLst>
           </p:cNvPr>
@@ -12778,18 +12764,14 @@
           <a:lstStyle/>
           <a:p>
             <a:r>
-              <a:rPr lang="en-CA" dirty="0" smtClean="0"/>
+              <a:rPr lang="en-CA" dirty="0"/>
               <a:t>Influenced by Wii design</a:t>
             </a:r>
           </a:p>
           <a:p>
             <a:r>
-              <a:rPr lang="en-CA" dirty="0" smtClean="0"/>
-              <a:t>Built on </a:t>
-            </a:r>
-            <a:r>
               <a:rPr lang="en-CA" dirty="0"/>
-              <a:t>pose estimation</a:t>
+              <a:t>Built on pose estimation</a:t>
             </a:r>
           </a:p>
           <a:p>
@@ -12797,23 +12779,17 @@
               <a:rPr lang="en-CA" dirty="0"/>
               <a:t>Train user in Liechtenauer fencing </a:t>
             </a:r>
-            <a:endParaRPr lang="en-CA" dirty="0" smtClean="0"/>
-          </a:p>
-          <a:p>
-            <a:r>
-              <a:rPr lang="en-CA" dirty="0" smtClean="0"/>
+          </a:p>
+          <a:p>
+            <a:r>
+              <a:rPr lang="en-CA" dirty="0"/>
               <a:t>Replaces need for an opponent</a:t>
             </a:r>
-            <a:endParaRPr lang="en-CA" dirty="0"/>
-          </a:p>
-          <a:p>
-            <a:r>
-              <a:rPr lang="en-CA" dirty="0" smtClean="0"/>
-              <a:t>Heavily </a:t>
-            </a:r>
+          </a:p>
+          <a:p>
             <a:r>
               <a:rPr lang="en-CA" dirty="0"/>
-              <a:t>focused on martial form</a:t>
+              <a:t>Heavily focused on martial form</a:t>
             </a:r>
           </a:p>
         </p:txBody>
@@ -12852,13 +12828,6 @@
   <p:clrMapOvr>
     <a:masterClrMapping/>
   </p:clrMapOvr>
-  <p:timing>
-    <p:tnLst>
-      <p:par>
-        <p:cTn id="1" dur="indefinite" restart="never" nodeType="tmRoot"/>
-      </p:par>
-    </p:tnLst>
-  </p:timing>
 </p:sld>
 </file>
 
@@ -12884,7 +12853,7 @@
           <p:cNvPr id="2" name="Title 1">
             <a:extLst>
               <a:ext uri="{FF2B5EF4-FFF2-40B4-BE49-F238E27FC236}">
-                <a16:creationId xmlns="" xmlns:a16="http://schemas.microsoft.com/office/drawing/2014/main" id="{AE97EAE8-F837-4285-A405-02763428144C}"/>
+                <a16:creationId xmlns:a16="http://schemas.microsoft.com/office/drawing/2014/main" id="{AE97EAE8-F837-4285-A405-02763428144C}"/>
               </a:ext>
             </a:extLst>
           </p:cNvPr>
@@ -12913,7 +12882,7 @@
           <p:cNvPr id="3" name="Content Placeholder 2">
             <a:extLst>
               <a:ext uri="{FF2B5EF4-FFF2-40B4-BE49-F238E27FC236}">
-                <a16:creationId xmlns="" xmlns:a16="http://schemas.microsoft.com/office/drawing/2014/main" id="{D9189252-2950-49E6-9939-B6381FCF79CB}"/>
+                <a16:creationId xmlns:a16="http://schemas.microsoft.com/office/drawing/2014/main" id="{D9189252-2950-49E6-9939-B6381FCF79CB}"/>
               </a:ext>
             </a:extLst>
           </p:cNvPr>
@@ -12966,7 +12935,7 @@
           <p:cNvPr id="4" name="Picture 3">
             <a:extLst>
               <a:ext uri="{FF2B5EF4-FFF2-40B4-BE49-F238E27FC236}">
-                <a16:creationId xmlns="" xmlns:a16="http://schemas.microsoft.com/office/drawing/2014/main" id="{8BB07A56-3380-40DB-BF9D-FD4C836C427F}"/>
+                <a16:creationId xmlns:a16="http://schemas.microsoft.com/office/drawing/2014/main" id="{8BB07A56-3380-40DB-BF9D-FD4C836C427F}"/>
               </a:ext>
             </a:extLst>
           </p:cNvPr>
@@ -12999,13 +12968,6 @@
   <p:clrMapOvr>
     <a:masterClrMapping/>
   </p:clrMapOvr>
-  <p:timing>
-    <p:tnLst>
-      <p:par>
-        <p:cTn id="1" dur="indefinite" restart="never" nodeType="tmRoot"/>
-      </p:par>
-    </p:tnLst>
-  </p:timing>
 </p:sld>
 </file>
 
@@ -13031,7 +12993,7 @@
           <p:cNvPr id="2" name="Title 1">
             <a:extLst>
               <a:ext uri="{FF2B5EF4-FFF2-40B4-BE49-F238E27FC236}">
-                <a16:creationId xmlns="" xmlns:a16="http://schemas.microsoft.com/office/drawing/2014/main" id="{A48BF5BC-06D6-49E3-BCD2-B5FEF4D93B21}"/>
+                <a16:creationId xmlns:a16="http://schemas.microsoft.com/office/drawing/2014/main" id="{A48BF5BC-06D6-49E3-BCD2-B5FEF4D93B21}"/>
               </a:ext>
             </a:extLst>
           </p:cNvPr>
@@ -13060,7 +13022,7 @@
           <p:cNvPr id="3" name="Content Placeholder 2">
             <a:extLst>
               <a:ext uri="{FF2B5EF4-FFF2-40B4-BE49-F238E27FC236}">
-                <a16:creationId xmlns="" xmlns:a16="http://schemas.microsoft.com/office/drawing/2014/main" id="{7C640F72-A454-411F-B0AE-3C2648885C1F}"/>
+                <a16:creationId xmlns:a16="http://schemas.microsoft.com/office/drawing/2014/main" id="{7C640F72-A454-411F-B0AE-3C2648885C1F}"/>
               </a:ext>
             </a:extLst>
           </p:cNvPr>
@@ -13096,7 +13058,7 @@
           <p:cNvPr id="8194" name="Picture 2" descr="Image result for responsiveness">
             <a:extLst>
               <a:ext uri="{FF2B5EF4-FFF2-40B4-BE49-F238E27FC236}">
-                <a16:creationId xmlns="" xmlns:a16="http://schemas.microsoft.com/office/drawing/2014/main" id="{262F3839-E0DD-403A-80AD-9CABD11E44D5}"/>
+                <a16:creationId xmlns:a16="http://schemas.microsoft.com/office/drawing/2014/main" id="{262F3839-E0DD-403A-80AD-9CABD11E44D5}"/>
               </a:ext>
             </a:extLst>
           </p:cNvPr>
@@ -13143,7 +13105,7 @@
           <p:cNvPr id="8196" name="Picture 4" descr="Image result for extensibility">
             <a:extLst>
               <a:ext uri="{FF2B5EF4-FFF2-40B4-BE49-F238E27FC236}">
-                <a16:creationId xmlns="" xmlns:a16="http://schemas.microsoft.com/office/drawing/2014/main" id="{60D4789D-2805-4880-8BF1-367C1B6D5D8F}"/>
+                <a16:creationId xmlns:a16="http://schemas.microsoft.com/office/drawing/2014/main" id="{60D4789D-2805-4880-8BF1-367C1B6D5D8F}"/>
               </a:ext>
             </a:extLst>
           </p:cNvPr>
@@ -13190,7 +13152,7 @@
           <p:cNvPr id="8198" name="Picture 6" descr="Image result for transmission data">
             <a:extLst>
               <a:ext uri="{FF2B5EF4-FFF2-40B4-BE49-F238E27FC236}">
-                <a16:creationId xmlns="" xmlns:a16="http://schemas.microsoft.com/office/drawing/2014/main" id="{07815C60-736A-4834-A52F-9A723C716A8F}"/>
+                <a16:creationId xmlns:a16="http://schemas.microsoft.com/office/drawing/2014/main" id="{07815C60-736A-4834-A52F-9A723C716A8F}"/>
               </a:ext>
             </a:extLst>
           </p:cNvPr>
@@ -13240,13 +13202,6 @@
   <p:clrMapOvr>
     <a:masterClrMapping/>
   </p:clrMapOvr>
-  <p:timing>
-    <p:tnLst>
-      <p:par>
-        <p:cTn id="1" dur="indefinite" restart="never" nodeType="tmRoot"/>
-      </p:par>
-    </p:tnLst>
-  </p:timing>
 </p:sld>
 </file>
 
@@ -13272,7 +13227,7 @@
           <p:cNvPr id="2" name="Title 1">
             <a:extLst>
               <a:ext uri="{FF2B5EF4-FFF2-40B4-BE49-F238E27FC236}">
-                <a16:creationId xmlns="" xmlns:a16="http://schemas.microsoft.com/office/drawing/2014/main" id="{73685AEB-4B13-451C-A998-59D5FEFABFE9}"/>
+                <a16:creationId xmlns:a16="http://schemas.microsoft.com/office/drawing/2014/main" id="{73685AEB-4B13-451C-A998-59D5FEFABFE9}"/>
               </a:ext>
             </a:extLst>
           </p:cNvPr>
@@ -13301,7 +13256,7 @@
           <p:cNvPr id="3" name="Content Placeholder 2">
             <a:extLst>
               <a:ext uri="{FF2B5EF4-FFF2-40B4-BE49-F238E27FC236}">
-                <a16:creationId xmlns="" xmlns:a16="http://schemas.microsoft.com/office/drawing/2014/main" id="{E7796D7E-33AF-4EAF-A882-1DF6A6A2CCAE}"/>
+                <a16:creationId xmlns:a16="http://schemas.microsoft.com/office/drawing/2014/main" id="{E7796D7E-33AF-4EAF-A882-1DF6A6A2CCAE}"/>
               </a:ext>
             </a:extLst>
           </p:cNvPr>
@@ -13346,7 +13301,7 @@
           <p:cNvPr id="9218" name="Picture 2" descr="Image result for system decomposition">
             <a:extLst>
               <a:ext uri="{FF2B5EF4-FFF2-40B4-BE49-F238E27FC236}">
-                <a16:creationId xmlns="" xmlns:a16="http://schemas.microsoft.com/office/drawing/2014/main" id="{60A8B4F5-A565-444A-95B4-5F4D1ADAFA63}"/>
+                <a16:creationId xmlns:a16="http://schemas.microsoft.com/office/drawing/2014/main" id="{60A8B4F5-A565-444A-95B4-5F4D1ADAFA63}"/>
               </a:ext>
             </a:extLst>
           </p:cNvPr>
@@ -13398,13 +13353,6 @@
   <p:clrMapOvr>
     <a:masterClrMapping/>
   </p:clrMapOvr>
-  <p:timing>
-    <p:tnLst>
-      <p:par>
-        <p:cTn id="1" dur="indefinite" restart="never" nodeType="tmRoot"/>
-      </p:par>
-    </p:tnLst>
-  </p:timing>
 </p:sld>
 </file>
 
@@ -13430,7 +13378,7 @@
           <p:cNvPr id="2" name="Title 1">
             <a:extLst>
               <a:ext uri="{FF2B5EF4-FFF2-40B4-BE49-F238E27FC236}">
-                <a16:creationId xmlns="" xmlns:a16="http://schemas.microsoft.com/office/drawing/2014/main" id="{E4160060-D251-40B8-BB5A-FA0122692BF2}"/>
+                <a16:creationId xmlns:a16="http://schemas.microsoft.com/office/drawing/2014/main" id="{E4160060-D251-40B8-BB5A-FA0122692BF2}"/>
               </a:ext>
             </a:extLst>
           </p:cNvPr>
@@ -13459,7 +13407,7 @@
           <p:cNvPr id="4" name="Content Placeholder 3">
             <a:extLst>
               <a:ext uri="{FF2B5EF4-FFF2-40B4-BE49-F238E27FC236}">
-                <a16:creationId xmlns="" xmlns:a16="http://schemas.microsoft.com/office/drawing/2014/main" id="{218C8E0D-64F9-4E9C-A778-D3C5C62767D5}"/>
+                <a16:creationId xmlns:a16="http://schemas.microsoft.com/office/drawing/2014/main" id="{218C8E0D-64F9-4E9C-A778-D3C5C62767D5}"/>
               </a:ext>
             </a:extLst>
           </p:cNvPr>
@@ -13502,13 +13450,6 @@
   <p:clrMapOvr>
     <a:masterClrMapping/>
   </p:clrMapOvr>
-  <p:timing>
-    <p:tnLst>
-      <p:par>
-        <p:cTn id="1" dur="indefinite" restart="never" nodeType="tmRoot"/>
-      </p:par>
-    </p:tnLst>
-  </p:timing>
 </p:sld>
 </file>
 
@@ -13534,7 +13475,7 @@
           <p:cNvPr id="2" name="Title 1">
             <a:extLst>
               <a:ext uri="{FF2B5EF4-FFF2-40B4-BE49-F238E27FC236}">
-                <a16:creationId xmlns="" xmlns:a16="http://schemas.microsoft.com/office/drawing/2014/main" id="{763F6662-A0FA-4FF3-A279-1080DC7E6912}"/>
+                <a16:creationId xmlns:a16="http://schemas.microsoft.com/office/drawing/2014/main" id="{763F6662-A0FA-4FF3-A279-1080DC7E6912}"/>
               </a:ext>
             </a:extLst>
           </p:cNvPr>
@@ -13571,7 +13512,7 @@
           <p:cNvPr id="4" name="Content Placeholder 3">
             <a:extLst>
               <a:ext uri="{FF2B5EF4-FFF2-40B4-BE49-F238E27FC236}">
-                <a16:creationId xmlns="" xmlns:a16="http://schemas.microsoft.com/office/drawing/2014/main" id="{96B76056-29A7-4A12-A0F7-2202EE446033}"/>
+                <a16:creationId xmlns:a16="http://schemas.microsoft.com/office/drawing/2014/main" id="{96B76056-29A7-4A12-A0F7-2202EE446033}"/>
               </a:ext>
             </a:extLst>
           </p:cNvPr>
@@ -13614,13 +13555,6 @@
   <p:clrMapOvr>
     <a:masterClrMapping/>
   </p:clrMapOvr>
-  <p:timing>
-    <p:tnLst>
-      <p:par>
-        <p:cTn id="1" dur="indefinite" restart="never" nodeType="tmRoot"/>
-      </p:par>
-    </p:tnLst>
-  </p:timing>
 </p:sld>
 </file>
 
@@ -13646,7 +13580,7 @@
           <p:cNvPr id="2" name="Title 1">
             <a:extLst>
               <a:ext uri="{FF2B5EF4-FFF2-40B4-BE49-F238E27FC236}">
-                <a16:creationId xmlns="" xmlns:a16="http://schemas.microsoft.com/office/drawing/2014/main" id="{75F87973-70DD-45EF-BEDE-9E70DA9BCEE2}"/>
+                <a16:creationId xmlns:a16="http://schemas.microsoft.com/office/drawing/2014/main" id="{75F87973-70DD-45EF-BEDE-9E70DA9BCEE2}"/>
               </a:ext>
             </a:extLst>
           </p:cNvPr>
@@ -13675,7 +13609,7 @@
           <p:cNvPr id="3" name="Content Placeholder 2">
             <a:extLst>
               <a:ext uri="{FF2B5EF4-FFF2-40B4-BE49-F238E27FC236}">
-                <a16:creationId xmlns="" xmlns:a16="http://schemas.microsoft.com/office/drawing/2014/main" id="{8FB90D3D-63C3-4EFC-975C-208A992896AC}"/>
+                <a16:creationId xmlns:a16="http://schemas.microsoft.com/office/drawing/2014/main" id="{8FB90D3D-63C3-4EFC-975C-208A992896AC}"/>
               </a:ext>
             </a:extLst>
           </p:cNvPr>
@@ -13697,22 +13631,21 @@
           <a:lstStyle/>
           <a:p>
             <a:r>
-              <a:rPr lang="en-CA" dirty="0" smtClean="0"/>
+              <a:rPr lang="en-CA" dirty="0"/>
               <a:t>High Level: ???</a:t>
             </a:r>
           </a:p>
           <a:p>
             <a:r>
-              <a:rPr lang="en-CA" dirty="0" smtClean="0"/>
+              <a:rPr lang="en-CA" dirty="0"/>
               <a:t>Application Level: Unity3d</a:t>
             </a:r>
           </a:p>
           <a:p>
             <a:r>
-              <a:rPr lang="en-CA" dirty="0" smtClean="0"/>
+              <a:rPr lang="en-CA" dirty="0"/>
               <a:t>Low Level: Wand Control Inputs</a:t>
             </a:r>
-            <a:endParaRPr lang="en-CA" dirty="0"/>
           </a:p>
         </p:txBody>
       </p:sp>
@@ -13721,7 +13654,7 @@
           <p:cNvPr id="10242" name="Picture 2" descr="Image result for software pyramid">
             <a:extLst>
               <a:ext uri="{FF2B5EF4-FFF2-40B4-BE49-F238E27FC236}">
-                <a16:creationId xmlns="" xmlns:a16="http://schemas.microsoft.com/office/drawing/2014/main" id="{A4761379-A0C5-4E96-BD9B-E1D72E38E757}"/>
+                <a16:creationId xmlns:a16="http://schemas.microsoft.com/office/drawing/2014/main" id="{A4761379-A0C5-4E96-BD9B-E1D72E38E757}"/>
               </a:ext>
             </a:extLst>
           </p:cNvPr>
@@ -13771,13 +13704,6 @@
   <p:clrMapOvr>
     <a:masterClrMapping/>
   </p:clrMapOvr>
-  <p:timing>
-    <p:tnLst>
-      <p:par>
-        <p:cTn id="1" dur="indefinite" restart="never" nodeType="tmRoot"/>
-      </p:par>
-    </p:tnLst>
-  </p:timing>
 </p:sld>
 </file>
 
@@ -13803,7 +13729,7 @@
           <p:cNvPr id="2" name="Title 1">
             <a:extLst>
               <a:ext uri="{FF2B5EF4-FFF2-40B4-BE49-F238E27FC236}">
-                <a16:creationId xmlns="" xmlns:a16="http://schemas.microsoft.com/office/drawing/2014/main" id="{75F87973-70DD-45EF-BEDE-9E70DA9BCEE2}"/>
+                <a16:creationId xmlns:a16="http://schemas.microsoft.com/office/drawing/2014/main" id="{75F87973-70DD-45EF-BEDE-9E70DA9BCEE2}"/>
               </a:ext>
             </a:extLst>
           </p:cNvPr>
@@ -13821,10 +13747,9 @@
           <a:p>
             <a:pPr algn="ctr"/>
             <a:r>
-              <a:rPr lang="en-CA" dirty="0" smtClean="0"/>
+              <a:rPr lang="en-CA" dirty="0"/>
               <a:t>Software Architecture Design Patterns</a:t>
             </a:r>
-            <a:endParaRPr lang="en-CA" dirty="0"/>
           </a:p>
         </p:txBody>
       </p:sp>
@@ -13833,7 +13758,7 @@
           <p:cNvPr id="5" name="Content Placeholder 2">
             <a:extLst>
               <a:ext uri="{FF2B5EF4-FFF2-40B4-BE49-F238E27FC236}">
-                <a16:creationId xmlns="" xmlns:a16="http://schemas.microsoft.com/office/drawing/2014/main" id="{7C640F72-A454-411F-B0AE-3C2648885C1F}"/>
+                <a16:creationId xmlns:a16="http://schemas.microsoft.com/office/drawing/2014/main" id="{7C640F72-A454-411F-B0AE-3C2648885C1F}"/>
               </a:ext>
             </a:extLst>
           </p:cNvPr>
@@ -14034,10 +13959,9 @@
               <a:buNone/>
             </a:pPr>
             <a:r>
-              <a:rPr lang="en-CA" sz="2000" dirty="0" smtClean="0"/>
+              <a:rPr lang="en-CA" sz="2000" dirty="0"/>
               <a:t>A generalized software solution applicable to multiple contexts</a:t>
             </a:r>
-            <a:endParaRPr lang="en-CA" sz="2000" dirty="0"/>
           </a:p>
         </p:txBody>
       </p:sp>
@@ -14138,13 +14062,6 @@
   <p:clrMapOvr>
     <a:masterClrMapping/>
   </p:clrMapOvr>
-  <p:timing>
-    <p:tnLst>
-      <p:par>
-        <p:cTn id="1" dur="indefinite" restart="never" nodeType="tmRoot"/>
-      </p:par>
-    </p:tnLst>
-  </p:timing>
 </p:sld>
 </file>
 
@@ -14182,10 +14099,9 @@
           <a:p>
             <a:pPr algn="ctr"/>
             <a:r>
-              <a:rPr lang="en-CA" dirty="0" smtClean="0"/>
+              <a:rPr lang="en-CA" dirty="0"/>
               <a:t>Model View Controller</a:t>
             </a:r>
-            <a:endParaRPr lang="en-CA" dirty="0"/>
           </a:p>
         </p:txBody>
       </p:sp>
@@ -14210,24 +14126,24 @@
           <a:lstStyle/>
           <a:p>
             <a:r>
-              <a:rPr lang="en-CA" dirty="0" smtClean="0"/>
+              <a:rPr lang="en-CA" dirty="0"/>
               <a:t>Easily modifiable and extensible</a:t>
             </a:r>
           </a:p>
           <a:p>
             <a:r>
-              <a:rPr lang="en-CA" dirty="0" smtClean="0"/>
+              <a:rPr lang="en-CA" dirty="0"/>
               <a:t>Common practice in industry</a:t>
             </a:r>
           </a:p>
           <a:p>
             <a:r>
-              <a:rPr lang="en-CA" dirty="0" smtClean="0"/>
+              <a:rPr lang="en-CA" dirty="0"/>
               <a:t>Built around reactions to user input</a:t>
             </a:r>
           </a:p>
           <a:p>
-            <a:endParaRPr lang="en-CA" dirty="0" smtClean="0"/>
+            <a:endParaRPr lang="en-CA" dirty="0"/>
           </a:p>
           <a:p>
             <a:endParaRPr lang="en-CA" dirty="0"/>
@@ -14278,13 +14194,6 @@
   <p:clrMapOvr>
     <a:masterClrMapping/>
   </p:clrMapOvr>
-  <p:timing>
-    <p:tnLst>
-      <p:par>
-        <p:cTn id="1" dur="indefinite" restart="never" nodeType="tmRoot"/>
-      </p:par>
-    </p:tnLst>
-  </p:timing>
 </p:sld>
 </file>
 
@@ -14310,7 +14219,7 @@
           <p:cNvPr id="2" name="Title 1">
             <a:extLst>
               <a:ext uri="{FF2B5EF4-FFF2-40B4-BE49-F238E27FC236}">
-                <a16:creationId xmlns="" xmlns:a16="http://schemas.microsoft.com/office/drawing/2014/main" id="{36A5512F-DA0A-4155-B467-7CE21F143616}"/>
+                <a16:creationId xmlns:a16="http://schemas.microsoft.com/office/drawing/2014/main" id="{36A5512F-DA0A-4155-B467-7CE21F143616}"/>
               </a:ext>
             </a:extLst>
           </p:cNvPr>
@@ -14328,10 +14237,9 @@
           <a:p>
             <a:pPr algn="ctr"/>
             <a:r>
-              <a:rPr lang="en-CA" dirty="0" smtClean="0"/>
+              <a:rPr lang="en-CA" dirty="0"/>
               <a:t>Presentation Outline</a:t>
             </a:r>
-            <a:endParaRPr lang="en-CA" dirty="0"/>
           </a:p>
         </p:txBody>
       </p:sp>
@@ -14340,7 +14248,7 @@
           <p:cNvPr id="3" name="Content Placeholder 2">
             <a:extLst>
               <a:ext uri="{FF2B5EF4-FFF2-40B4-BE49-F238E27FC236}">
-                <a16:creationId xmlns="" xmlns:a16="http://schemas.microsoft.com/office/drawing/2014/main" id="{E64228CB-BBE3-4152-B8E5-8D60ABA4DD80}"/>
+                <a16:creationId xmlns:a16="http://schemas.microsoft.com/office/drawing/2014/main" id="{E64228CB-BBE3-4152-B8E5-8D60ABA4DD80}"/>
               </a:ext>
             </a:extLst>
           </p:cNvPr>
@@ -14362,31 +14270,31 @@
           <a:lstStyle/>
           <a:p>
             <a:r>
-              <a:rPr lang="en-CA" dirty="0" smtClean="0"/>
+              <a:rPr lang="en-CA" dirty="0"/>
               <a:t>Project Overview</a:t>
             </a:r>
           </a:p>
           <a:p>
             <a:r>
-              <a:rPr lang="en-CA" dirty="0" smtClean="0"/>
+              <a:rPr lang="en-CA" dirty="0"/>
               <a:t>Background Concepts</a:t>
             </a:r>
           </a:p>
           <a:p>
             <a:r>
-              <a:rPr lang="en-CA" dirty="0" smtClean="0"/>
+              <a:rPr lang="en-CA" dirty="0"/>
               <a:t>Software System Design Process</a:t>
             </a:r>
           </a:p>
           <a:p>
             <a:r>
-              <a:rPr lang="en-CA" dirty="0" smtClean="0"/>
+              <a:rPr lang="en-CA" dirty="0"/>
               <a:t>Hardware Input Design Process</a:t>
             </a:r>
           </a:p>
           <a:p>
             <a:r>
-              <a:rPr lang="en-CA" dirty="0" smtClean="0"/>
+              <a:rPr lang="en-CA" dirty="0"/>
               <a:t>Conclusion</a:t>
             </a:r>
           </a:p>
@@ -14439,13 +14347,6 @@
   <p:clrMapOvr>
     <a:masterClrMapping/>
   </p:clrMapOvr>
-  <p:timing>
-    <p:tnLst>
-      <p:par>
-        <p:cTn id="1" dur="indefinite" restart="never" nodeType="tmRoot"/>
-      </p:par>
-    </p:tnLst>
-  </p:timing>
 </p:sld>
 </file>
 
@@ -14471,7 +14372,7 @@
           <p:cNvPr id="2" name="Title 1">
             <a:extLst>
               <a:ext uri="{FF2B5EF4-FFF2-40B4-BE49-F238E27FC236}">
-                <a16:creationId xmlns="" xmlns:a16="http://schemas.microsoft.com/office/drawing/2014/main" id="{F25659FA-40BB-416A-97AE-15B6618B6967}"/>
+                <a16:creationId xmlns:a16="http://schemas.microsoft.com/office/drawing/2014/main" id="{F25659FA-40BB-416A-97AE-15B6618B6967}"/>
               </a:ext>
             </a:extLst>
           </p:cNvPr>
@@ -14489,10 +14390,9 @@
           <a:p>
             <a:pPr algn="ctr"/>
             <a:r>
-              <a:rPr lang="en-CA" dirty="0" smtClean="0"/>
+              <a:rPr lang="en-CA" dirty="0"/>
               <a:t>Domain Model</a:t>
             </a:r>
-            <a:endParaRPr lang="en-CA" dirty="0"/>
           </a:p>
         </p:txBody>
       </p:sp>
@@ -14501,7 +14401,7 @@
           <p:cNvPr id="5" name="Content Placeholder 4">
             <a:extLst>
               <a:ext uri="{FF2B5EF4-FFF2-40B4-BE49-F238E27FC236}">
-                <a16:creationId xmlns="" xmlns:a16="http://schemas.microsoft.com/office/drawing/2014/main" id="{B32A5AC4-23C1-4C77-8506-5F26EA9CE498}"/>
+                <a16:creationId xmlns:a16="http://schemas.microsoft.com/office/drawing/2014/main" id="{B32A5AC4-23C1-4C77-8506-5F26EA9CE498}"/>
               </a:ext>
             </a:extLst>
           </p:cNvPr>
@@ -14541,13 +14441,6 @@
   <p:clrMapOvr>
     <a:masterClrMapping/>
   </p:clrMapOvr>
-  <p:timing>
-    <p:tnLst>
-      <p:par>
-        <p:cTn id="1" dur="indefinite" restart="never" nodeType="tmRoot"/>
-      </p:par>
-    </p:tnLst>
-  </p:timing>
 </p:sld>
 </file>
 
@@ -14573,7 +14466,7 @@
           <p:cNvPr id="2" name="Title 1">
             <a:extLst>
               <a:ext uri="{FF2B5EF4-FFF2-40B4-BE49-F238E27FC236}">
-                <a16:creationId xmlns="" xmlns:a16="http://schemas.microsoft.com/office/drawing/2014/main" id="{D2B70648-F767-4919-A6C2-683C73BC25A1}"/>
+                <a16:creationId xmlns:a16="http://schemas.microsoft.com/office/drawing/2014/main" id="{D2B70648-F767-4919-A6C2-683C73BC25A1}"/>
               </a:ext>
             </a:extLst>
           </p:cNvPr>
@@ -14602,7 +14495,7 @@
           <p:cNvPr id="3" name="Content Placeholder 2">
             <a:extLst>
               <a:ext uri="{FF2B5EF4-FFF2-40B4-BE49-F238E27FC236}">
-                <a16:creationId xmlns="" xmlns:a16="http://schemas.microsoft.com/office/drawing/2014/main" id="{6ACADFAF-F2F4-452B-9B91-161ABA28ABC0}"/>
+                <a16:creationId xmlns:a16="http://schemas.microsoft.com/office/drawing/2014/main" id="{6ACADFAF-F2F4-452B-9B91-161ABA28ABC0}"/>
               </a:ext>
             </a:extLst>
           </p:cNvPr>
@@ -14668,13 +14561,6 @@
   <p:clrMapOvr>
     <a:masterClrMapping/>
   </p:clrMapOvr>
-  <p:timing>
-    <p:tnLst>
-      <p:par>
-        <p:cTn id="1" dur="indefinite" restart="never" nodeType="tmRoot"/>
-      </p:par>
-    </p:tnLst>
-  </p:timing>
 </p:sld>
 </file>
 
@@ -14780,7 +14666,7 @@
           <p:cNvPr id="5" name="Picture 4" descr="A circuit board&#10;&#10;Description generated with very high confidence">
             <a:extLst>
               <a:ext uri="{FF2B5EF4-FFF2-40B4-BE49-F238E27FC236}">
-                <a16:creationId xmlns="" xmlns:a16="http://schemas.microsoft.com/office/drawing/2014/main" id="{DBAE08E4-3D00-4CC8-A76B-D1694D8CF289}"/>
+                <a16:creationId xmlns:a16="http://schemas.microsoft.com/office/drawing/2014/main" id="{DBAE08E4-3D00-4CC8-A76B-D1694D8CF289}"/>
               </a:ext>
             </a:extLst>
           </p:cNvPr>
@@ -14821,13 +14707,6 @@
   <p:clrMapOvr>
     <a:masterClrMapping/>
   </p:clrMapOvr>
-  <p:timing>
-    <p:tnLst>
-      <p:par>
-        <p:cTn id="1" dur="indefinite" restart="never" nodeType="tmRoot"/>
-      </p:par>
-    </p:tnLst>
-  </p:timing>
 </p:sld>
 </file>
 
@@ -14926,7 +14805,7 @@
           <p:cNvPr id="5" name="Picture 4" descr="A picture containing object&#10;&#10;Description generated with very high confidence">
             <a:extLst>
               <a:ext uri="{FF2B5EF4-FFF2-40B4-BE49-F238E27FC236}">
-                <a16:creationId xmlns="" xmlns:a16="http://schemas.microsoft.com/office/drawing/2014/main" id="{A0A3EDC0-EB69-40FA-9588-ABDB2891EE5E}"/>
+                <a16:creationId xmlns:a16="http://schemas.microsoft.com/office/drawing/2014/main" id="{A0A3EDC0-EB69-40FA-9588-ABDB2891EE5E}"/>
               </a:ext>
             </a:extLst>
           </p:cNvPr>
@@ -14967,13 +14846,6 @@
   <p:clrMapOvr>
     <a:masterClrMapping/>
   </p:clrMapOvr>
-  <p:timing>
-    <p:tnLst>
-      <p:par>
-        <p:cTn id="1" dur="indefinite" restart="never" nodeType="tmRoot"/>
-      </p:par>
-    </p:tnLst>
-  </p:timing>
 </p:sld>
 </file>
 
@@ -14999,7 +14871,7 @@
           <p:cNvPr id="2" name="Title 1">
             <a:extLst>
               <a:ext uri="{FF2B5EF4-FFF2-40B4-BE49-F238E27FC236}">
-                <a16:creationId xmlns="" xmlns:a16="http://schemas.microsoft.com/office/drawing/2014/main" id="{4ACF1BA8-E11A-4BF1-99CB-CEBBCEE25196}"/>
+                <a16:creationId xmlns:a16="http://schemas.microsoft.com/office/drawing/2014/main" id="{4ACF1BA8-E11A-4BF1-99CB-CEBBCEE25196}"/>
               </a:ext>
             </a:extLst>
           </p:cNvPr>
@@ -15029,7 +14901,7 @@
           <p:cNvPr id="3" name="Content Placeholder 2">
             <a:extLst>
               <a:ext uri="{FF2B5EF4-FFF2-40B4-BE49-F238E27FC236}">
-                <a16:creationId xmlns="" xmlns:a16="http://schemas.microsoft.com/office/drawing/2014/main" id="{2101CA67-66B5-4054-984C-F46D93EDE818}"/>
+                <a16:creationId xmlns:a16="http://schemas.microsoft.com/office/drawing/2014/main" id="{2101CA67-66B5-4054-984C-F46D93EDE818}"/>
               </a:ext>
             </a:extLst>
           </p:cNvPr>
@@ -15085,13 +14957,6 @@
   <p:clrMapOvr>
     <a:masterClrMapping/>
   </p:clrMapOvr>
-  <p:timing>
-    <p:tnLst>
-      <p:par>
-        <p:cTn id="1" dur="indefinite" restart="never" nodeType="tmRoot"/>
-      </p:par>
-    </p:tnLst>
-  </p:timing>
 </p:sld>
 </file>
 
@@ -15117,7 +14982,7 @@
           <p:cNvPr id="2" name="Title 1">
             <a:extLst>
               <a:ext uri="{FF2B5EF4-FFF2-40B4-BE49-F238E27FC236}">
-                <a16:creationId xmlns="" xmlns:a16="http://schemas.microsoft.com/office/drawing/2014/main" id="{E672BB30-DE1C-407B-AA2A-C9DC748CEEC0}"/>
+                <a16:creationId xmlns:a16="http://schemas.microsoft.com/office/drawing/2014/main" id="{E672BB30-DE1C-407B-AA2A-C9DC748CEEC0}"/>
               </a:ext>
             </a:extLst>
           </p:cNvPr>
@@ -15147,7 +15012,7 @@
           <p:cNvPr id="3" name="Content Placeholder 2">
             <a:extLst>
               <a:ext uri="{FF2B5EF4-FFF2-40B4-BE49-F238E27FC236}">
-                <a16:creationId xmlns="" xmlns:a16="http://schemas.microsoft.com/office/drawing/2014/main" id="{72DED6C5-F150-4901-988D-F9D0231EF761}"/>
+                <a16:creationId xmlns:a16="http://schemas.microsoft.com/office/drawing/2014/main" id="{72DED6C5-F150-4901-988D-F9D0231EF761}"/>
               </a:ext>
             </a:extLst>
           </p:cNvPr>
@@ -15183,13 +15048,6 @@
   <p:clrMapOvr>
     <a:masterClrMapping/>
   </p:clrMapOvr>
-  <p:timing>
-    <p:tnLst>
-      <p:par>
-        <p:cTn id="1" dur="indefinite" restart="never" nodeType="tmRoot"/>
-      </p:par>
-    </p:tnLst>
-  </p:timing>
 </p:sld>
 </file>
 
@@ -15280,7 +15138,7 @@
           <p:cNvPr id="5" name="Picture 4">
             <a:extLst>
               <a:ext uri="{FF2B5EF4-FFF2-40B4-BE49-F238E27FC236}">
-                <a16:creationId xmlns="" xmlns:a16="http://schemas.microsoft.com/office/drawing/2014/main" id="{5169DC0A-87E2-4FF0-9DA4-0715A203EF3F}"/>
+                <a16:creationId xmlns:a16="http://schemas.microsoft.com/office/drawing/2014/main" id="{5169DC0A-87E2-4FF0-9DA4-0715A203EF3F}"/>
               </a:ext>
             </a:extLst>
           </p:cNvPr>
@@ -15321,13 +15179,6 @@
   <p:clrMapOvr>
     <a:masterClrMapping/>
   </p:clrMapOvr>
-  <p:timing>
-    <p:tnLst>
-      <p:par>
-        <p:cTn id="1" dur="indefinite" restart="never" nodeType="tmRoot"/>
-      </p:par>
-    </p:tnLst>
-  </p:timing>
 </p:sld>
 </file>
 
@@ -15365,10 +15216,9 @@
           <a:p>
             <a:pPr algn="ctr"/>
             <a:r>
-              <a:rPr lang="en-CA" dirty="0" smtClean="0"/>
+              <a:rPr lang="en-CA" dirty="0"/>
               <a:t>Progress So Far</a:t>
             </a:r>
-            <a:endParaRPr lang="en-CA" dirty="0"/>
           </a:p>
         </p:txBody>
       </p:sp>
@@ -15412,7 +15262,7 @@
           <p:cNvPr id="7" name="Content Placeholder 2">
             <a:extLst>
               <a:ext uri="{FF2B5EF4-FFF2-40B4-BE49-F238E27FC236}">
-                <a16:creationId xmlns="" xmlns:a16="http://schemas.microsoft.com/office/drawing/2014/main" id="{7C640F72-A454-411F-B0AE-3C2648885C1F}"/>
+                <a16:creationId xmlns:a16="http://schemas.microsoft.com/office/drawing/2014/main" id="{7C640F72-A454-411F-B0AE-3C2648885C1F}"/>
               </a:ext>
             </a:extLst>
           </p:cNvPr>
@@ -15442,34 +15292,38 @@
             </a:pPr>
             <a:r>
               <a:rPr lang="en-CA" dirty="0"/>
-              <a:t>	</a:t>
-            </a:r>
-            <a:r>
-              <a:rPr lang="en-CA" dirty="0" smtClean="0"/>
-              <a:t>September 2017	January 2018</a:t>
-            </a:r>
-            <a:endParaRPr lang="en-CA" dirty="0"/>
+              <a:t>	  September 2017	 January 2018</a:t>
+            </a:r>
           </a:p>
         </p:txBody>
       </p:sp>
       <p:pic>
         <p:nvPicPr>
-          <p:cNvPr id="9" name="Picture 8"/>
-          <p:cNvPicPr/>
+          <p:cNvPr id="4" name="Picture 3" descr="A screenshot of a cell phone&#10;&#10;Description generated with high confidence">
+            <a:extLst>
+              <a:ext uri="{FF2B5EF4-FFF2-40B4-BE49-F238E27FC236}">
+                <a16:creationId xmlns:a16="http://schemas.microsoft.com/office/drawing/2014/main" id="{509D05F7-E304-4FA7-9028-316850A94711}"/>
+              </a:ext>
+            </a:extLst>
+          </p:cNvPr>
+          <p:cNvPicPr>
+            <a:picLocks noChangeAspect="1"/>
+          </p:cNvPicPr>
           <p:nvPr/>
         </p:nvPicPr>
-        <p:blipFill rotWithShape="1">
-          <a:blip r:embed="rId2">
+        <p:blipFill>
+          <a:blip r:embed="rId3">
             <a:extLst>
               <a:ext uri="{28A0092B-C50C-407E-A947-70E740481C1C}">
                 <a14:useLocalDpi xmlns:a14="http://schemas.microsoft.com/office/drawing/2010/main" val="0"/>
               </a:ext>
             </a:extLst>
           </a:blip>
-          <a:srcRect r="28686"/>
-          <a:stretch/>
+          <a:stretch>
+            <a:fillRect/>
+          </a:stretch>
         </p:blipFill>
-        <p:spPr bwMode="auto">
+        <p:spPr>
           <a:xfrm>
             <a:off x="6551595" y="2700836"/>
             <a:ext cx="4495816" cy="2853239"/>
@@ -15477,14 +15331,6 @@
           <a:prstGeom prst="rect">
             <a:avLst/>
           </a:prstGeom>
-          <a:ln>
-            <a:noFill/>
-          </a:ln>
-          <a:extLst>
-            <a:ext uri="{53640926-AAD7-44D8-BBD7-CCE9431645EC}">
-              <a14:shadowObscured xmlns:a14="http://schemas.microsoft.com/office/drawing/2010/main"/>
-            </a:ext>
-          </a:extLst>
         </p:spPr>
       </p:pic>
     </p:spTree>
@@ -15497,13 +15343,6 @@
   <p:clrMapOvr>
     <a:masterClrMapping/>
   </p:clrMapOvr>
-  <p:timing>
-    <p:tnLst>
-      <p:par>
-        <p:cTn id="1" dur="indefinite" restart="never" nodeType="tmRoot"/>
-      </p:par>
-    </p:tnLst>
-  </p:timing>
 </p:sld>
 </file>
 
@@ -15541,10 +15380,9 @@
           <a:p>
             <a:pPr algn="ctr"/>
             <a:r>
-              <a:rPr lang="en-CA" dirty="0" smtClean="0"/>
+              <a:rPr lang="en-CA" dirty="0"/>
               <a:t>Project Roadblocks</a:t>
             </a:r>
-            <a:endParaRPr lang="en-CA" dirty="0"/>
           </a:p>
         </p:txBody>
       </p:sp>
@@ -15563,7 +15401,48 @@
           <a:bodyPr/>
           <a:lstStyle/>
           <a:p>
-            <a:endParaRPr lang="en-CA"/>
+            <a:r>
+              <a:rPr lang="en-CA" dirty="0" err="1"/>
+              <a:t>Wiimote</a:t>
+            </a:r>
+            <a:r>
+              <a:rPr lang="en-CA" dirty="0"/>
+              <a:t> Plus – the original input system</a:t>
+            </a:r>
+          </a:p>
+          <a:p>
+            <a:pPr lvl="1"/>
+            <a:r>
+              <a:rPr lang="en-CA" dirty="0"/>
+              <a:t>It was insufficient when trying to estimate orientation and position</a:t>
+            </a:r>
+          </a:p>
+          <a:p>
+            <a:pPr lvl="1"/>
+            <a:r>
+              <a:rPr lang="en-CA" dirty="0"/>
+              <a:t>Replaced with the Federuino system</a:t>
+            </a:r>
+          </a:p>
+          <a:p>
+            <a:r>
+              <a:rPr lang="en-CA" dirty="0"/>
+              <a:t>Original Bluetooth module</a:t>
+            </a:r>
+          </a:p>
+          <a:p>
+            <a:pPr lvl="1"/>
+            <a:r>
+              <a:rPr lang="en-CA" dirty="0"/>
+              <a:t>Scarce documentation for the original module delayed progress and after, the module ceased functioning</a:t>
+            </a:r>
+          </a:p>
+          <a:p>
+            <a:pPr lvl="1"/>
+            <a:r>
+              <a:rPr lang="en-CA" dirty="0"/>
+              <a:t>Replaced with the SEEED Bluetooth Shield</a:t>
+            </a:r>
           </a:p>
         </p:txBody>
       </p:sp>
@@ -15577,13 +15456,6 @@
   <p:clrMapOvr>
     <a:masterClrMapping/>
   </p:clrMapOvr>
-  <p:timing>
-    <p:tnLst>
-      <p:par>
-        <p:cTn id="1" dur="indefinite" restart="never" nodeType="tmRoot"/>
-      </p:par>
-    </p:tnLst>
-  </p:timing>
 </p:sld>
 </file>
 
@@ -15609,7 +15481,7 @@
           <p:cNvPr id="2" name="Title 1">
             <a:extLst>
               <a:ext uri="{FF2B5EF4-FFF2-40B4-BE49-F238E27FC236}">
-                <a16:creationId xmlns="" xmlns:a16="http://schemas.microsoft.com/office/drawing/2014/main" id="{F3803F2D-DAF2-45A6-A9E5-9C8445154E8F}"/>
+                <a16:creationId xmlns:a16="http://schemas.microsoft.com/office/drawing/2014/main" id="{F3803F2D-DAF2-45A6-A9E5-9C8445154E8F}"/>
               </a:ext>
             </a:extLst>
           </p:cNvPr>
@@ -15627,10 +15499,9 @@
           <a:p>
             <a:pPr algn="ctr"/>
             <a:r>
-              <a:rPr lang="en-US" dirty="0" smtClean="0"/>
+              <a:rPr lang="en-US" dirty="0"/>
               <a:t>References</a:t>
             </a:r>
-            <a:endParaRPr lang="en-US" dirty="0"/>
           </a:p>
         </p:txBody>
       </p:sp>
@@ -15639,7 +15510,7 @@
           <p:cNvPr id="3" name="Content Placeholder 2">
             <a:extLst>
               <a:ext uri="{FF2B5EF4-FFF2-40B4-BE49-F238E27FC236}">
-                <a16:creationId xmlns="" xmlns:a16="http://schemas.microsoft.com/office/drawing/2014/main" id="{D9758561-4EBB-4DA0-B49E-A158313B8F68}"/>
+                <a16:creationId xmlns:a16="http://schemas.microsoft.com/office/drawing/2014/main" id="{D9758561-4EBB-4DA0-B49E-A158313B8F68}"/>
               </a:ext>
             </a:extLst>
           </p:cNvPr>
@@ -15679,11 +15550,7 @@
             </a:r>
             <a:r>
               <a:rPr lang="en-US" sz="1400" dirty="0"/>
-              <a:t>Cambridge: University of Cambridge, p. 21-23. Available at: https://www.cl.cam.ac.uk/techreports/UCAM-CL-TR-696.pdf (Accessed 20 Jan,2018</a:t>
-            </a:r>
-            <a:r>
-              <a:rPr lang="en-US" sz="1400" dirty="0" smtClean="0"/>
-              <a:t>)</a:t>
+              <a:t>Cambridge: University of Cambridge, p. 21-23. Available at: https://www.cl.cam.ac.uk/techreports/UCAM-CL-TR-696.pdf (Accessed 20 Jan,2018)</a:t>
             </a:r>
           </a:p>
           <a:p>
@@ -15693,11 +15560,7 @@
             </a:pPr>
             <a:r>
               <a:rPr lang="en-CA" sz="1400" dirty="0"/>
-              <a:t>The Open Group. (2006). Architectural Patterns. Retrieved January 22, 2018, from http://</a:t>
-            </a:r>
-            <a:r>
-              <a:rPr lang="en-CA" sz="1400" dirty="0" smtClean="0"/>
-              <a:t>pubs.opengroup.org/architecture/togaf8-doc/arch/chap28.html</a:t>
+              <a:t>The Open Group. (2006). Architectural Patterns. Retrieved January 22, 2018, from http://pubs.opengroup.org/architecture/togaf8-doc/arch/chap28.html</a:t>
             </a:r>
           </a:p>
           <a:p>
@@ -15711,13 +15574,9 @@
             </a:r>
             <a:r>
               <a:rPr lang="en-CA" sz="1400" dirty="0"/>
-              <a:t>, V. (2017, September 04). 10 Common Software Architectural Patterns. Retrieved January 23, 2018, from https://</a:t>
-            </a:r>
-            <a:r>
-              <a:rPr lang="en-CA" sz="1400" dirty="0" smtClean="0"/>
-              <a:t>towardsdatascience.com/10-common-software-architectural-patterns-in-a-nutshell-a0b47a1e9013</a:t>
-            </a:r>
-            <a:endParaRPr lang="en-US" sz="1400" dirty="0" smtClean="0"/>
+              <a:t>, V. (2017, September 04). 10 Common Software Architectural Patterns. Retrieved January 23, 2018, from https://towardsdatascience.com/10-common-software-architectural-patterns-in-a-nutshell-a0b47a1e9013</a:t>
+            </a:r>
+            <a:endParaRPr lang="en-US" sz="1400" dirty="0"/>
           </a:p>
           <a:p>
             <a:pPr>
@@ -15736,7 +15595,7 @@
               <a:rPr lang="en-CA" sz="1400" dirty="0"/>
               <a:t>). Scenes Documentation. Retrieved January 24, 2018, from https://docs.unity3d.com/Manual/CreatingScenes.html</a:t>
             </a:r>
-            <a:endParaRPr lang="en-US" sz="1400" dirty="0" smtClean="0"/>
+            <a:endParaRPr lang="en-US" sz="1400" dirty="0"/>
           </a:p>
           <a:p>
             <a:pPr>
@@ -15757,13 +15616,6 @@
   <p:clrMapOvr>
     <a:masterClrMapping/>
   </p:clrMapOvr>
-  <p:timing>
-    <p:tnLst>
-      <p:par>
-        <p:cTn id="1" dur="indefinite" restart="never" nodeType="tmRoot"/>
-      </p:par>
-    </p:tnLst>
-  </p:timing>
 </p:sld>
 </file>
 
@@ -15789,7 +15641,7 @@
           <p:cNvPr id="2" name="Title 1">
             <a:extLst>
               <a:ext uri="{FF2B5EF4-FFF2-40B4-BE49-F238E27FC236}">
-                <a16:creationId xmlns="" xmlns:a16="http://schemas.microsoft.com/office/drawing/2014/main" id="{36A5512F-DA0A-4155-B467-7CE21F143616}"/>
+                <a16:creationId xmlns:a16="http://schemas.microsoft.com/office/drawing/2014/main" id="{36A5512F-DA0A-4155-B467-7CE21F143616}"/>
               </a:ext>
             </a:extLst>
           </p:cNvPr>
@@ -15807,10 +15659,9 @@
           <a:p>
             <a:pPr algn="ctr"/>
             <a:r>
-              <a:rPr lang="en-CA" dirty="0" smtClean="0"/>
+              <a:rPr lang="en-CA" dirty="0"/>
               <a:t>Project Objective</a:t>
             </a:r>
-            <a:endParaRPr lang="en-CA" dirty="0"/>
           </a:p>
         </p:txBody>
       </p:sp>
@@ -15819,7 +15670,7 @@
           <p:cNvPr id="3" name="Content Placeholder 2">
             <a:extLst>
               <a:ext uri="{FF2B5EF4-FFF2-40B4-BE49-F238E27FC236}">
-                <a16:creationId xmlns="" xmlns:a16="http://schemas.microsoft.com/office/drawing/2014/main" id="{E64228CB-BBE3-4152-B8E5-8D60ABA4DD80}"/>
+                <a16:creationId xmlns:a16="http://schemas.microsoft.com/office/drawing/2014/main" id="{E64228CB-BBE3-4152-B8E5-8D60ABA4DD80}"/>
               </a:ext>
             </a:extLst>
           </p:cNvPr>
@@ -15844,10 +15695,9 @@
               <a:buNone/>
             </a:pPr>
             <a:r>
-              <a:rPr lang="en-CA" dirty="0" smtClean="0"/>
+              <a:rPr lang="en-CA" dirty="0"/>
               <a:t>Provide reliable HEMA training to novices without the need for a trainer </a:t>
             </a:r>
-            <a:endParaRPr lang="en-CA" dirty="0"/>
           </a:p>
         </p:txBody>
       </p:sp>
@@ -15900,13 +15750,6 @@
   <p:clrMapOvr>
     <a:masterClrMapping/>
   </p:clrMapOvr>
-  <p:timing>
-    <p:tnLst>
-      <p:par>
-        <p:cTn id="1" dur="indefinite" restart="never" nodeType="tmRoot"/>
-      </p:par>
-    </p:tnLst>
-  </p:timing>
 </p:sld>
 </file>
 
@@ -15932,7 +15775,7 @@
           <p:cNvPr id="2" name="Title 1">
             <a:extLst>
               <a:ext uri="{FF2B5EF4-FFF2-40B4-BE49-F238E27FC236}">
-                <a16:creationId xmlns="" xmlns:a16="http://schemas.microsoft.com/office/drawing/2014/main" id="{1F284F98-4938-4E13-ADBC-87557807C8E9}"/>
+                <a16:creationId xmlns:a16="http://schemas.microsoft.com/office/drawing/2014/main" id="{1F284F98-4938-4E13-ADBC-87557807C8E9}"/>
               </a:ext>
             </a:extLst>
           </p:cNvPr>
@@ -15950,10 +15793,9 @@
           <a:p>
             <a:pPr algn="ctr"/>
             <a:r>
-              <a:rPr lang="en-US" dirty="0" smtClean="0"/>
+              <a:rPr lang="en-US" dirty="0"/>
               <a:t>In Conclusion</a:t>
             </a:r>
-            <a:endParaRPr lang="en-US" dirty="0"/>
           </a:p>
         </p:txBody>
       </p:sp>
@@ -15978,20 +15820,19 @@
           <a:lstStyle/>
           <a:p>
             <a:r>
-              <a:rPr lang="en-CA" dirty="0" smtClean="0"/>
+              <a:rPr lang="en-CA" dirty="0"/>
               <a:t>HEMA training simulator progresses, if slowly</a:t>
             </a:r>
-            <a:endParaRPr lang="en-CA" dirty="0"/>
-          </a:p>
-          <a:p>
-            <a:r>
-              <a:rPr lang="en-CA" dirty="0" smtClean="0"/>
+          </a:p>
+          <a:p>
+            <a:r>
+              <a:rPr lang="en-CA" dirty="0"/>
               <a:t>Next steps are input recording and standardizing</a:t>
             </a:r>
           </a:p>
           <a:p>
             <a:r>
-              <a:rPr lang="en-CA" dirty="0" smtClean="0"/>
+              <a:rPr lang="en-CA" dirty="0"/>
               <a:t>On track for March 2018 completion</a:t>
             </a:r>
           </a:p>
@@ -16046,13 +15887,6 @@
   <p:clrMapOvr>
     <a:masterClrMapping/>
   </p:clrMapOvr>
-  <p:timing>
-    <p:tnLst>
-      <p:par>
-        <p:cTn id="1" dur="indefinite" restart="never" nodeType="tmRoot"/>
-      </p:par>
-    </p:tnLst>
-  </p:timing>
 </p:sld>
 </file>
 
@@ -16078,7 +15912,7 @@
           <p:cNvPr id="2" name="Title 1">
             <a:extLst>
               <a:ext uri="{FF2B5EF4-FFF2-40B4-BE49-F238E27FC236}">
-                <a16:creationId xmlns="" xmlns:a16="http://schemas.microsoft.com/office/drawing/2014/main" id="{1F284F98-4938-4E13-ADBC-87557807C8E9}"/>
+                <a16:creationId xmlns:a16="http://schemas.microsoft.com/office/drawing/2014/main" id="{1F284F98-4938-4E13-ADBC-87557807C8E9}"/>
               </a:ext>
             </a:extLst>
           </p:cNvPr>
@@ -16089,17 +15923,52 @@
             <p:ph type="title"/>
           </p:nvPr>
         </p:nvSpPr>
-        <p:spPr/>
+        <p:spPr>
+          <a:xfrm>
+            <a:off x="1141413" y="618518"/>
+            <a:ext cx="9905998" cy="5859400"/>
+          </a:xfrm>
+        </p:spPr>
         <p:txBody>
           <a:bodyPr/>
           <a:lstStyle/>
           <a:p>
             <a:pPr algn="ctr"/>
             <a:r>
-              <a:rPr lang="en-US" dirty="0" smtClean="0"/>
+              <a:rPr lang="en-US" dirty="0"/>
               <a:t>Thanks for Listening!</a:t>
             </a:r>
-            <a:endParaRPr lang="en-US" dirty="0"/>
+            <a:br>
+              <a:rPr lang="en-US" dirty="0"/>
+            </a:br>
+            <a:br>
+              <a:rPr lang="en-US" dirty="0"/>
+            </a:br>
+            <a:br>
+              <a:rPr lang="en-US" dirty="0"/>
+            </a:br>
+            <a:br>
+              <a:rPr lang="en-US" dirty="0"/>
+            </a:br>
+            <a:br>
+              <a:rPr lang="en-US" dirty="0"/>
+            </a:br>
+            <a:br>
+              <a:rPr lang="en-US" dirty="0"/>
+            </a:br>
+            <a:br>
+              <a:rPr lang="en-US" dirty="0"/>
+            </a:br>
+            <a:br>
+              <a:rPr lang="en-US" dirty="0"/>
+            </a:br>
+            <a:br>
+              <a:rPr lang="en-US" dirty="0"/>
+            </a:br>
+            <a:r>
+              <a:rPr lang="en-US" dirty="0"/>
+              <a:t>Questions?</a:t>
+            </a:r>
           </a:p>
         </p:txBody>
       </p:sp>
@@ -16128,8 +15997,8 @@
         </p:blipFill>
         <p:spPr bwMode="auto">
           <a:xfrm>
-            <a:off x="3953835" y="2160835"/>
-            <a:ext cx="4281154" cy="4281154"/>
+            <a:off x="4518389" y="2097088"/>
+            <a:ext cx="3152045" cy="3152045"/>
           </a:xfrm>
           <a:prstGeom prst="rect">
             <a:avLst/>
@@ -16156,13 +16025,6 @@
   <p:clrMapOvr>
     <a:masterClrMapping/>
   </p:clrMapOvr>
-  <p:timing>
-    <p:tnLst>
-      <p:par>
-        <p:cTn id="1" dur="indefinite" restart="never" nodeType="tmRoot"/>
-      </p:par>
-    </p:tnLst>
-  </p:timing>
 </p:sld>
 </file>
 
@@ -16188,7 +16050,7 @@
           <p:cNvPr id="2" name="Title 1">
             <a:extLst>
               <a:ext uri="{FF2B5EF4-FFF2-40B4-BE49-F238E27FC236}">
-                <a16:creationId xmlns="" xmlns:a16="http://schemas.microsoft.com/office/drawing/2014/main" id="{36A5512F-DA0A-4155-B467-7CE21F143616}"/>
+                <a16:creationId xmlns:a16="http://schemas.microsoft.com/office/drawing/2014/main" id="{36A5512F-DA0A-4155-B467-7CE21F143616}"/>
               </a:ext>
             </a:extLst>
           </p:cNvPr>
@@ -16217,7 +16079,7 @@
           <p:cNvPr id="3" name="Content Placeholder 2">
             <a:extLst>
               <a:ext uri="{FF2B5EF4-FFF2-40B4-BE49-F238E27FC236}">
-                <a16:creationId xmlns="" xmlns:a16="http://schemas.microsoft.com/office/drawing/2014/main" id="{E64228CB-BBE3-4152-B8E5-8D60ABA4DD80}"/>
+                <a16:creationId xmlns:a16="http://schemas.microsoft.com/office/drawing/2014/main" id="{E64228CB-BBE3-4152-B8E5-8D60ABA4DD80}"/>
               </a:ext>
             </a:extLst>
           </p:cNvPr>
@@ -16262,7 +16124,7 @@
           <p:cNvPr id="3074" name="Picture 2" descr="Image result for confused">
             <a:extLst>
               <a:ext uri="{FF2B5EF4-FFF2-40B4-BE49-F238E27FC236}">
-                <a16:creationId xmlns="" xmlns:a16="http://schemas.microsoft.com/office/drawing/2014/main" id="{E1005C07-9659-4122-93F1-890F6F4988EA}"/>
+                <a16:creationId xmlns:a16="http://schemas.microsoft.com/office/drawing/2014/main" id="{E1005C07-9659-4122-93F1-890F6F4988EA}"/>
               </a:ext>
             </a:extLst>
           </p:cNvPr>
@@ -16314,13 +16176,6 @@
   <p:clrMapOvr>
     <a:masterClrMapping/>
   </p:clrMapOvr>
-  <p:timing>
-    <p:tnLst>
-      <p:par>
-        <p:cTn id="1" dur="indefinite" restart="never" nodeType="tmRoot"/>
-      </p:par>
-    </p:tnLst>
-  </p:timing>
 </p:sld>
 </file>
 
@@ -16346,7 +16201,7 @@
           <p:cNvPr id="2" name="Title 1">
             <a:extLst>
               <a:ext uri="{FF2B5EF4-FFF2-40B4-BE49-F238E27FC236}">
-                <a16:creationId xmlns="" xmlns:a16="http://schemas.microsoft.com/office/drawing/2014/main" id="{A226FFC3-0B76-4B58-B7F4-EA7CA37664C0}"/>
+                <a16:creationId xmlns:a16="http://schemas.microsoft.com/office/drawing/2014/main" id="{A226FFC3-0B76-4B58-B7F4-EA7CA37664C0}"/>
               </a:ext>
             </a:extLst>
           </p:cNvPr>
@@ -16375,7 +16230,7 @@
           <p:cNvPr id="1026" name="Picture 2" descr="Image result for martial arts stock photo">
             <a:extLst>
               <a:ext uri="{FF2B5EF4-FFF2-40B4-BE49-F238E27FC236}">
-                <a16:creationId xmlns="" xmlns:a16="http://schemas.microsoft.com/office/drawing/2014/main" id="{35DFDF86-5D75-4EF2-ABCC-75ADBA41345B}"/>
+                <a16:creationId xmlns:a16="http://schemas.microsoft.com/office/drawing/2014/main" id="{35DFDF86-5D75-4EF2-ABCC-75ADBA41345B}"/>
               </a:ext>
             </a:extLst>
           </p:cNvPr>
@@ -16422,7 +16277,7 @@
           <p:cNvPr id="1028" name="Picture 4" descr="Image result for fencing sword stock photo">
             <a:extLst>
               <a:ext uri="{FF2B5EF4-FFF2-40B4-BE49-F238E27FC236}">
-                <a16:creationId xmlns="" xmlns:a16="http://schemas.microsoft.com/office/drawing/2014/main" id="{9C0671BE-82B5-4A7B-B979-A9BB819D7EA0}"/>
+                <a16:creationId xmlns:a16="http://schemas.microsoft.com/office/drawing/2014/main" id="{9C0671BE-82B5-4A7B-B979-A9BB819D7EA0}"/>
               </a:ext>
             </a:extLst>
           </p:cNvPr>
@@ -16469,7 +16324,7 @@
           <p:cNvPr id="5" name="TextBox 4">
             <a:extLst>
               <a:ext uri="{FF2B5EF4-FFF2-40B4-BE49-F238E27FC236}">
-                <a16:creationId xmlns="" xmlns:a16="http://schemas.microsoft.com/office/drawing/2014/main" id="{9167E0EE-7DE5-46F2-9436-8515EA8BFCCE}"/>
+                <a16:creationId xmlns:a16="http://schemas.microsoft.com/office/drawing/2014/main" id="{9167E0EE-7DE5-46F2-9436-8515EA8BFCCE}"/>
               </a:ext>
             </a:extLst>
           </p:cNvPr>
@@ -16504,7 +16359,7 @@
           <p:cNvPr id="1030" name="Picture 6" descr="Image result for bo staff pose">
             <a:extLst>
               <a:ext uri="{FF2B5EF4-FFF2-40B4-BE49-F238E27FC236}">
-                <a16:creationId xmlns="" xmlns:a16="http://schemas.microsoft.com/office/drawing/2014/main" id="{3E44751B-CF30-4DE1-9F87-01F2D4CD1345}"/>
+                <a16:creationId xmlns:a16="http://schemas.microsoft.com/office/drawing/2014/main" id="{3E44751B-CF30-4DE1-9F87-01F2D4CD1345}"/>
               </a:ext>
             </a:extLst>
           </p:cNvPr>
@@ -16556,13 +16411,6 @@
   <p:clrMapOvr>
     <a:masterClrMapping/>
   </p:clrMapOvr>
-  <p:timing>
-    <p:tnLst>
-      <p:par>
-        <p:cTn id="1" dur="indefinite" restart="never" nodeType="tmRoot"/>
-      </p:par>
-    </p:tnLst>
-  </p:timing>
 </p:sld>
 </file>
 
@@ -16588,7 +16436,7 @@
           <p:cNvPr id="2" name="Title 1">
             <a:extLst>
               <a:ext uri="{FF2B5EF4-FFF2-40B4-BE49-F238E27FC236}">
-                <a16:creationId xmlns="" xmlns:a16="http://schemas.microsoft.com/office/drawing/2014/main" id="{64D337EA-02F4-4FB4-8A67-402AE4DD9340}"/>
+                <a16:creationId xmlns:a16="http://schemas.microsoft.com/office/drawing/2014/main" id="{64D337EA-02F4-4FB4-8A67-402AE4DD9340}"/>
               </a:ext>
             </a:extLst>
           </p:cNvPr>
@@ -16617,7 +16465,7 @@
           <p:cNvPr id="2050" name="Picture 2" descr="Image result for historical european martial arts">
             <a:extLst>
               <a:ext uri="{FF2B5EF4-FFF2-40B4-BE49-F238E27FC236}">
-                <a16:creationId xmlns="" xmlns:a16="http://schemas.microsoft.com/office/drawing/2014/main" id="{3717EEE2-7DC0-40CE-8512-44B65253AFC2}"/>
+                <a16:creationId xmlns:a16="http://schemas.microsoft.com/office/drawing/2014/main" id="{3717EEE2-7DC0-40CE-8512-44B65253AFC2}"/>
               </a:ext>
             </a:extLst>
           </p:cNvPr>
@@ -16664,7 +16512,7 @@
           <p:cNvPr id="2052" name="Picture 4" descr="http://www.hemac.org/img/pic/i33.jpg">
             <a:extLst>
               <a:ext uri="{FF2B5EF4-FFF2-40B4-BE49-F238E27FC236}">
-                <a16:creationId xmlns="" xmlns:a16="http://schemas.microsoft.com/office/drawing/2014/main" id="{A283EDD7-8455-4A55-97ED-DA763A0C8B58}"/>
+                <a16:creationId xmlns:a16="http://schemas.microsoft.com/office/drawing/2014/main" id="{A283EDD7-8455-4A55-97ED-DA763A0C8B58}"/>
               </a:ext>
             </a:extLst>
           </p:cNvPr>
@@ -16711,7 +16559,7 @@
           <p:cNvPr id="4" name="TextBox 3">
             <a:extLst>
               <a:ext uri="{FF2B5EF4-FFF2-40B4-BE49-F238E27FC236}">
-                <a16:creationId xmlns="" xmlns:a16="http://schemas.microsoft.com/office/drawing/2014/main" id="{A6C94766-E3A3-4C42-9BD7-3FA8965FBF80}"/>
+                <a16:creationId xmlns:a16="http://schemas.microsoft.com/office/drawing/2014/main" id="{A6C94766-E3A3-4C42-9BD7-3FA8965FBF80}"/>
               </a:ext>
             </a:extLst>
           </p:cNvPr>
@@ -16751,13 +16599,6 @@
   <p:clrMapOvr>
     <a:masterClrMapping/>
   </p:clrMapOvr>
-  <p:timing>
-    <p:tnLst>
-      <p:par>
-        <p:cTn id="1" dur="indefinite" restart="never" nodeType="tmRoot"/>
-      </p:par>
-    </p:tnLst>
-  </p:timing>
 </p:sld>
 </file>
 
@@ -16783,7 +16624,7 @@
           <p:cNvPr id="2" name="Title 1">
             <a:extLst>
               <a:ext uri="{FF2B5EF4-FFF2-40B4-BE49-F238E27FC236}">
-                <a16:creationId xmlns="" xmlns:a16="http://schemas.microsoft.com/office/drawing/2014/main" id="{87750F07-33DE-427A-9D3B-1AC46D29D5C5}"/>
+                <a16:creationId xmlns:a16="http://schemas.microsoft.com/office/drawing/2014/main" id="{87750F07-33DE-427A-9D3B-1AC46D29D5C5}"/>
               </a:ext>
             </a:extLst>
           </p:cNvPr>
@@ -16816,7 +16657,7 @@
           <p:cNvPr id="3" name="Content Placeholder 2">
             <a:extLst>
               <a:ext uri="{FF2B5EF4-FFF2-40B4-BE49-F238E27FC236}">
-                <a16:creationId xmlns="" xmlns:a16="http://schemas.microsoft.com/office/drawing/2014/main" id="{27957891-E8CF-4945-9E5A-1261E6F6E577}"/>
+                <a16:creationId xmlns:a16="http://schemas.microsoft.com/office/drawing/2014/main" id="{27957891-E8CF-4945-9E5A-1261E6F6E577}"/>
               </a:ext>
             </a:extLst>
           </p:cNvPr>
@@ -16877,7 +16718,7 @@
           <p:cNvPr id="4106" name="Picture 10" descr="Image result for federschwert">
             <a:extLst>
               <a:ext uri="{FF2B5EF4-FFF2-40B4-BE49-F238E27FC236}">
-                <a16:creationId xmlns="" xmlns:a16="http://schemas.microsoft.com/office/drawing/2014/main" id="{B84A99CF-5F5B-43D8-9783-F4A621B21032}"/>
+                <a16:creationId xmlns:a16="http://schemas.microsoft.com/office/drawing/2014/main" id="{B84A99CF-5F5B-43D8-9783-F4A621B21032}"/>
               </a:ext>
             </a:extLst>
           </p:cNvPr>
@@ -16927,13 +16768,6 @@
   <p:clrMapOvr>
     <a:masterClrMapping/>
   </p:clrMapOvr>
-  <p:timing>
-    <p:tnLst>
-      <p:par>
-        <p:cTn id="1" dur="indefinite" restart="never" nodeType="tmRoot"/>
-      </p:par>
-    </p:tnLst>
-  </p:timing>
 </p:sld>
 </file>
 
@@ -16959,7 +16793,7 @@
           <p:cNvPr id="2" name="Title 1">
             <a:extLst>
               <a:ext uri="{FF2B5EF4-FFF2-40B4-BE49-F238E27FC236}">
-                <a16:creationId xmlns="" xmlns:a16="http://schemas.microsoft.com/office/drawing/2014/main" id="{62A73FB6-C61F-42A7-AA59-33990FCC769C}"/>
+                <a16:creationId xmlns:a16="http://schemas.microsoft.com/office/drawing/2014/main" id="{62A73FB6-C61F-42A7-AA59-33990FCC769C}"/>
               </a:ext>
             </a:extLst>
           </p:cNvPr>
@@ -16988,7 +16822,7 @@
           <p:cNvPr id="4" name="TextBox 3">
             <a:extLst>
               <a:ext uri="{FF2B5EF4-FFF2-40B4-BE49-F238E27FC236}">
-                <a16:creationId xmlns="" xmlns:a16="http://schemas.microsoft.com/office/drawing/2014/main" id="{C0179942-D8BA-4453-85AC-C0980C3806BA}"/>
+                <a16:creationId xmlns:a16="http://schemas.microsoft.com/office/drawing/2014/main" id="{C0179942-D8BA-4453-85AC-C0980C3806BA}"/>
               </a:ext>
             </a:extLst>
           </p:cNvPr>
@@ -17023,7 +16857,7 @@
           <p:cNvPr id="5122" name="Picture 2" descr="Image result for simulator">
             <a:extLst>
               <a:ext uri="{FF2B5EF4-FFF2-40B4-BE49-F238E27FC236}">
-                <a16:creationId xmlns="" xmlns:a16="http://schemas.microsoft.com/office/drawing/2014/main" id="{5EA3C10D-78E1-40D1-B006-678934D7CCEE}"/>
+                <a16:creationId xmlns:a16="http://schemas.microsoft.com/office/drawing/2014/main" id="{5EA3C10D-78E1-40D1-B006-678934D7CCEE}"/>
               </a:ext>
             </a:extLst>
           </p:cNvPr>
@@ -17070,7 +16904,7 @@
           <p:cNvPr id="5124" name="Picture 4" descr="https://www.gamegrin.com/assets/games/car-mechanic-simulator-2015/screenshots/car-mechanic-simulator-2015-screenshot-7.jpg">
             <a:extLst>
               <a:ext uri="{FF2B5EF4-FFF2-40B4-BE49-F238E27FC236}">
-                <a16:creationId xmlns="" xmlns:a16="http://schemas.microsoft.com/office/drawing/2014/main" id="{472D511B-17AF-4921-BE65-BC0124138252}"/>
+                <a16:creationId xmlns:a16="http://schemas.microsoft.com/office/drawing/2014/main" id="{472D511B-17AF-4921-BE65-BC0124138252}"/>
               </a:ext>
             </a:extLst>
           </p:cNvPr>
@@ -17122,13 +16956,6 @@
   <p:clrMapOvr>
     <a:masterClrMapping/>
   </p:clrMapOvr>
-  <p:timing>
-    <p:tnLst>
-      <p:par>
-        <p:cTn id="1" dur="indefinite" restart="never" nodeType="tmRoot"/>
-      </p:par>
-    </p:tnLst>
-  </p:timing>
 </p:sld>
 </file>
 
@@ -17154,7 +16981,7 @@
           <p:cNvPr id="2" name="Title 1">
             <a:extLst>
               <a:ext uri="{FF2B5EF4-FFF2-40B4-BE49-F238E27FC236}">
-                <a16:creationId xmlns="" xmlns:a16="http://schemas.microsoft.com/office/drawing/2014/main" id="{B67B30F8-209F-42BD-98AA-EA47CD1674E7}"/>
+                <a16:creationId xmlns:a16="http://schemas.microsoft.com/office/drawing/2014/main" id="{B67B30F8-209F-42BD-98AA-EA47CD1674E7}"/>
               </a:ext>
             </a:extLst>
           </p:cNvPr>
@@ -17183,7 +17010,7 @@
           <p:cNvPr id="3" name="Content Placeholder 2">
             <a:extLst>
               <a:ext uri="{FF2B5EF4-FFF2-40B4-BE49-F238E27FC236}">
-                <a16:creationId xmlns="" xmlns:a16="http://schemas.microsoft.com/office/drawing/2014/main" id="{E8FCC0D7-6C81-4DAD-A7AA-3D1B55688E2B}"/>
+                <a16:creationId xmlns:a16="http://schemas.microsoft.com/office/drawing/2014/main" id="{E8FCC0D7-6C81-4DAD-A7AA-3D1B55688E2B}"/>
               </a:ext>
             </a:extLst>
           </p:cNvPr>
@@ -17240,7 +17067,7 @@
           <p:cNvPr id="6146" name="Picture 2" descr="Image result for cloud computing">
             <a:extLst>
               <a:ext uri="{FF2B5EF4-FFF2-40B4-BE49-F238E27FC236}">
-                <a16:creationId xmlns="" xmlns:a16="http://schemas.microsoft.com/office/drawing/2014/main" id="{332127A4-AFB9-4DEA-B3C2-CADF02AD2E7E}"/>
+                <a16:creationId xmlns:a16="http://schemas.microsoft.com/office/drawing/2014/main" id="{332127A4-AFB9-4DEA-B3C2-CADF02AD2E7E}"/>
               </a:ext>
             </a:extLst>
           </p:cNvPr>
@@ -17292,13 +17119,6 @@
   <p:clrMapOvr>
     <a:masterClrMapping/>
   </p:clrMapOvr>
-  <p:timing>
-    <p:tnLst>
-      <p:par>
-        <p:cTn id="1" dur="indefinite" restart="never" nodeType="tmRoot"/>
-      </p:par>
-    </p:tnLst>
-  </p:timing>
 </p:sld>
 </file>
 

</xml_diff>